<commit_message>
Added files used on AWS, updated presentation to what was used to present
</commit_message>
<xml_diff>
--- a/presentation.pptx
+++ b/presentation.pptx
@@ -4,11 +4,18 @@
   <p:sldMasterIdLst>
     <p:sldMasterId id="2147483648" r:id="rId1"/>
   </p:sldMasterIdLst>
+  <p:notesMasterIdLst>
+    <p:notesMasterId r:id="rId10"/>
+  </p:notesMasterIdLst>
   <p:sldIdLst>
     <p:sldId id="256" r:id="rId2"/>
     <p:sldId id="257" r:id="rId3"/>
-    <p:sldId id="258" r:id="rId4"/>
-    <p:sldId id="259" r:id="rId5"/>
+    <p:sldId id="261" r:id="rId4"/>
+    <p:sldId id="258" r:id="rId5"/>
+    <p:sldId id="264" r:id="rId6"/>
+    <p:sldId id="262" r:id="rId7"/>
+    <p:sldId id="263" r:id="rId8"/>
+    <p:sldId id="259" r:id="rId9"/>
   </p:sldIdLst>
   <p:sldSz cx="12192000" cy="6858000"/>
   <p:notesSz cx="6858000" cy="9144000"/>
@@ -107,7 +114,446 @@
       </a:defRPr>
     </a:lvl9pPr>
   </p:defaultTextStyle>
+  <p:extLst>
+    <p:ext uri="{EFAFB233-063F-42B5-8137-9DF3F51BA10A}">
+      <p15:sldGuideLst xmlns:p15="http://schemas.microsoft.com/office/powerpoint/2012/main"/>
+    </p:ext>
+  </p:extLst>
 </p:presentation>
+</file>
+
+<file path=ppt/notesMasters/notesMaster1.xml><?xml version="1.0" encoding="utf-8"?>
+<p:notesMaster xmlns:a="http://schemas.openxmlformats.org/drawingml/2006/main" xmlns:r="http://schemas.openxmlformats.org/officeDocument/2006/relationships" xmlns:p="http://schemas.openxmlformats.org/presentationml/2006/main">
+  <p:cSld>
+    <p:bg>
+      <p:bgRef idx="1001">
+        <a:schemeClr val="bg1"/>
+      </p:bgRef>
+    </p:bg>
+    <p:spTree>
+      <p:nvGrpSpPr>
+        <p:cNvPr id="1" name=""/>
+        <p:cNvGrpSpPr/>
+        <p:nvPr/>
+      </p:nvGrpSpPr>
+      <p:grpSpPr>
+        <a:xfrm>
+          <a:off x="0" y="0"/>
+          <a:ext cx="0" cy="0"/>
+          <a:chOff x="0" y="0"/>
+          <a:chExt cx="0" cy="0"/>
+        </a:xfrm>
+      </p:grpSpPr>
+      <p:sp>
+        <p:nvSpPr>
+          <p:cNvPr id="2" name="Header Placeholder 1"/>
+          <p:cNvSpPr>
+            <a:spLocks noGrp="1"/>
+          </p:cNvSpPr>
+          <p:nvPr>
+            <p:ph type="hdr" sz="quarter"/>
+          </p:nvPr>
+        </p:nvSpPr>
+        <p:spPr>
+          <a:xfrm>
+            <a:off x="0" y="0"/>
+            <a:ext cx="2971800" cy="458788"/>
+          </a:xfrm>
+          <a:prstGeom prst="rect">
+            <a:avLst/>
+          </a:prstGeom>
+        </p:spPr>
+        <p:txBody>
+          <a:bodyPr vert="horz" lIns="91440" tIns="45720" rIns="91440" bIns="45720" rtlCol="0"/>
+          <a:lstStyle>
+            <a:lvl1pPr algn="l">
+              <a:defRPr sz="1200"/>
+            </a:lvl1pPr>
+          </a:lstStyle>
+          <a:p>
+            <a:endParaRPr lang="en-US"/>
+          </a:p>
+        </p:txBody>
+      </p:sp>
+      <p:sp>
+        <p:nvSpPr>
+          <p:cNvPr id="3" name="Date Placeholder 2"/>
+          <p:cNvSpPr>
+            <a:spLocks noGrp="1"/>
+          </p:cNvSpPr>
+          <p:nvPr>
+            <p:ph type="dt" idx="1"/>
+          </p:nvPr>
+        </p:nvSpPr>
+        <p:spPr>
+          <a:xfrm>
+            <a:off x="3884613" y="0"/>
+            <a:ext cx="2971800" cy="458788"/>
+          </a:xfrm>
+          <a:prstGeom prst="rect">
+            <a:avLst/>
+          </a:prstGeom>
+        </p:spPr>
+        <p:txBody>
+          <a:bodyPr vert="horz" lIns="91440" tIns="45720" rIns="91440" bIns="45720" rtlCol="0"/>
+          <a:lstStyle>
+            <a:lvl1pPr algn="r">
+              <a:defRPr sz="1200"/>
+            </a:lvl1pPr>
+          </a:lstStyle>
+          <a:p>
+            <a:fld id="{B45EE095-C14E-4171-8175-C18B9C0381D3}" type="datetimeFigureOut">
+              <a:rPr lang="en-US" smtClean="0"/>
+              <a:t>10/20/2019</a:t>
+            </a:fld>
+            <a:endParaRPr lang="en-US"/>
+          </a:p>
+        </p:txBody>
+      </p:sp>
+      <p:sp>
+        <p:nvSpPr>
+          <p:cNvPr id="4" name="Slide Image Placeholder 3"/>
+          <p:cNvSpPr>
+            <a:spLocks noGrp="1" noRot="1" noChangeAspect="1"/>
+          </p:cNvSpPr>
+          <p:nvPr>
+            <p:ph type="sldImg" idx="2"/>
+          </p:nvPr>
+        </p:nvSpPr>
+        <p:spPr>
+          <a:xfrm>
+            <a:off x="685800" y="1143000"/>
+            <a:ext cx="5486400" cy="3086100"/>
+          </a:xfrm>
+          <a:prstGeom prst="rect">
+            <a:avLst/>
+          </a:prstGeom>
+          <a:noFill/>
+          <a:ln w="12700">
+            <a:solidFill>
+              <a:prstClr val="black"/>
+            </a:solidFill>
+          </a:ln>
+        </p:spPr>
+        <p:txBody>
+          <a:bodyPr vert="horz" lIns="91440" tIns="45720" rIns="91440" bIns="45720" rtlCol="0" anchor="ctr"/>
+          <a:lstStyle/>
+          <a:p>
+            <a:endParaRPr lang="en-US"/>
+          </a:p>
+        </p:txBody>
+      </p:sp>
+      <p:sp>
+        <p:nvSpPr>
+          <p:cNvPr id="5" name="Notes Placeholder 4"/>
+          <p:cNvSpPr>
+            <a:spLocks noGrp="1"/>
+          </p:cNvSpPr>
+          <p:nvPr>
+            <p:ph type="body" sz="quarter" idx="3"/>
+          </p:nvPr>
+        </p:nvSpPr>
+        <p:spPr>
+          <a:xfrm>
+            <a:off x="685800" y="4400550"/>
+            <a:ext cx="5486400" cy="3600450"/>
+          </a:xfrm>
+          <a:prstGeom prst="rect">
+            <a:avLst/>
+          </a:prstGeom>
+        </p:spPr>
+        <p:txBody>
+          <a:bodyPr vert="horz" lIns="91440" tIns="45720" rIns="91440" bIns="45720" rtlCol="0"/>
+          <a:lstStyle/>
+          <a:p>
+            <a:pPr lvl="0"/>
+            <a:r>
+              <a:rPr lang="en-US" smtClean="0"/>
+              <a:t>Click to edit Master text styles</a:t>
+            </a:r>
+          </a:p>
+          <a:p>
+            <a:pPr lvl="1"/>
+            <a:r>
+              <a:rPr lang="en-US" smtClean="0"/>
+              <a:t>Second level</a:t>
+            </a:r>
+          </a:p>
+          <a:p>
+            <a:pPr lvl="2"/>
+            <a:r>
+              <a:rPr lang="en-US" smtClean="0"/>
+              <a:t>Third level</a:t>
+            </a:r>
+          </a:p>
+          <a:p>
+            <a:pPr lvl="3"/>
+            <a:r>
+              <a:rPr lang="en-US" smtClean="0"/>
+              <a:t>Fourth level</a:t>
+            </a:r>
+          </a:p>
+          <a:p>
+            <a:pPr lvl="4"/>
+            <a:r>
+              <a:rPr lang="en-US" smtClean="0"/>
+              <a:t>Fifth level</a:t>
+            </a:r>
+            <a:endParaRPr lang="en-US"/>
+          </a:p>
+        </p:txBody>
+      </p:sp>
+      <p:sp>
+        <p:nvSpPr>
+          <p:cNvPr id="6" name="Footer Placeholder 5"/>
+          <p:cNvSpPr>
+            <a:spLocks noGrp="1"/>
+          </p:cNvSpPr>
+          <p:nvPr>
+            <p:ph type="ftr" sz="quarter" idx="4"/>
+          </p:nvPr>
+        </p:nvSpPr>
+        <p:spPr>
+          <a:xfrm>
+            <a:off x="0" y="8685213"/>
+            <a:ext cx="2971800" cy="458787"/>
+          </a:xfrm>
+          <a:prstGeom prst="rect">
+            <a:avLst/>
+          </a:prstGeom>
+        </p:spPr>
+        <p:txBody>
+          <a:bodyPr vert="horz" lIns="91440" tIns="45720" rIns="91440" bIns="45720" rtlCol="0" anchor="b"/>
+          <a:lstStyle>
+            <a:lvl1pPr algn="l">
+              <a:defRPr sz="1200"/>
+            </a:lvl1pPr>
+          </a:lstStyle>
+          <a:p>
+            <a:endParaRPr lang="en-US"/>
+          </a:p>
+        </p:txBody>
+      </p:sp>
+      <p:sp>
+        <p:nvSpPr>
+          <p:cNvPr id="7" name="Slide Number Placeholder 6"/>
+          <p:cNvSpPr>
+            <a:spLocks noGrp="1"/>
+          </p:cNvSpPr>
+          <p:nvPr>
+            <p:ph type="sldNum" sz="quarter" idx="5"/>
+          </p:nvPr>
+        </p:nvSpPr>
+        <p:spPr>
+          <a:xfrm>
+            <a:off x="3884613" y="8685213"/>
+            <a:ext cx="2971800" cy="458787"/>
+          </a:xfrm>
+          <a:prstGeom prst="rect">
+            <a:avLst/>
+          </a:prstGeom>
+        </p:spPr>
+        <p:txBody>
+          <a:bodyPr vert="horz" lIns="91440" tIns="45720" rIns="91440" bIns="45720" rtlCol="0" anchor="b"/>
+          <a:lstStyle>
+            <a:lvl1pPr algn="r">
+              <a:defRPr sz="1200"/>
+            </a:lvl1pPr>
+          </a:lstStyle>
+          <a:p>
+            <a:fld id="{26B33744-A8EE-4C3B-9A44-BACF3237857A}" type="slidenum">
+              <a:rPr lang="en-US" smtClean="0"/>
+              <a:t>‹#›</a:t>
+            </a:fld>
+            <a:endParaRPr lang="en-US"/>
+          </a:p>
+        </p:txBody>
+      </p:sp>
+    </p:spTree>
+    <p:extLst>
+      <p:ext uri="{BB962C8B-B14F-4D97-AF65-F5344CB8AC3E}">
+        <p14:creationId xmlns:p14="http://schemas.microsoft.com/office/powerpoint/2010/main" val="2722603157"/>
+      </p:ext>
+    </p:extLst>
+  </p:cSld>
+  <p:clrMap bg1="lt1" tx1="dk1" bg2="lt2" tx2="dk2" accent1="accent1" accent2="accent2" accent3="accent3" accent4="accent4" accent5="accent5" accent6="accent6" hlink="hlink" folHlink="folHlink"/>
+  <p:notesStyle>
+    <a:lvl1pPr marL="0" algn="l" defTabSz="914400" rtl="0" eaLnBrk="1" latinLnBrk="0" hangingPunct="1">
+      <a:defRPr sz="1200" kern="1200">
+        <a:solidFill>
+          <a:schemeClr val="tx1"/>
+        </a:solidFill>
+        <a:latin typeface="+mn-lt"/>
+        <a:ea typeface="+mn-ea"/>
+        <a:cs typeface="+mn-cs"/>
+      </a:defRPr>
+    </a:lvl1pPr>
+    <a:lvl2pPr marL="457200" algn="l" defTabSz="914400" rtl="0" eaLnBrk="1" latinLnBrk="0" hangingPunct="1">
+      <a:defRPr sz="1200" kern="1200">
+        <a:solidFill>
+          <a:schemeClr val="tx1"/>
+        </a:solidFill>
+        <a:latin typeface="+mn-lt"/>
+        <a:ea typeface="+mn-ea"/>
+        <a:cs typeface="+mn-cs"/>
+      </a:defRPr>
+    </a:lvl2pPr>
+    <a:lvl3pPr marL="914400" algn="l" defTabSz="914400" rtl="0" eaLnBrk="1" latinLnBrk="0" hangingPunct="1">
+      <a:defRPr sz="1200" kern="1200">
+        <a:solidFill>
+          <a:schemeClr val="tx1"/>
+        </a:solidFill>
+        <a:latin typeface="+mn-lt"/>
+        <a:ea typeface="+mn-ea"/>
+        <a:cs typeface="+mn-cs"/>
+      </a:defRPr>
+    </a:lvl3pPr>
+    <a:lvl4pPr marL="1371600" algn="l" defTabSz="914400" rtl="0" eaLnBrk="1" latinLnBrk="0" hangingPunct="1">
+      <a:defRPr sz="1200" kern="1200">
+        <a:solidFill>
+          <a:schemeClr val="tx1"/>
+        </a:solidFill>
+        <a:latin typeface="+mn-lt"/>
+        <a:ea typeface="+mn-ea"/>
+        <a:cs typeface="+mn-cs"/>
+      </a:defRPr>
+    </a:lvl4pPr>
+    <a:lvl5pPr marL="1828800" algn="l" defTabSz="914400" rtl="0" eaLnBrk="1" latinLnBrk="0" hangingPunct="1">
+      <a:defRPr sz="1200" kern="1200">
+        <a:solidFill>
+          <a:schemeClr val="tx1"/>
+        </a:solidFill>
+        <a:latin typeface="+mn-lt"/>
+        <a:ea typeface="+mn-ea"/>
+        <a:cs typeface="+mn-cs"/>
+      </a:defRPr>
+    </a:lvl5pPr>
+    <a:lvl6pPr marL="2286000" algn="l" defTabSz="914400" rtl="0" eaLnBrk="1" latinLnBrk="0" hangingPunct="1">
+      <a:defRPr sz="1200" kern="1200">
+        <a:solidFill>
+          <a:schemeClr val="tx1"/>
+        </a:solidFill>
+        <a:latin typeface="+mn-lt"/>
+        <a:ea typeface="+mn-ea"/>
+        <a:cs typeface="+mn-cs"/>
+      </a:defRPr>
+    </a:lvl6pPr>
+    <a:lvl7pPr marL="2743200" algn="l" defTabSz="914400" rtl="0" eaLnBrk="1" latinLnBrk="0" hangingPunct="1">
+      <a:defRPr sz="1200" kern="1200">
+        <a:solidFill>
+          <a:schemeClr val="tx1"/>
+        </a:solidFill>
+        <a:latin typeface="+mn-lt"/>
+        <a:ea typeface="+mn-ea"/>
+        <a:cs typeface="+mn-cs"/>
+      </a:defRPr>
+    </a:lvl7pPr>
+    <a:lvl8pPr marL="3200400" algn="l" defTabSz="914400" rtl="0" eaLnBrk="1" latinLnBrk="0" hangingPunct="1">
+      <a:defRPr sz="1200" kern="1200">
+        <a:solidFill>
+          <a:schemeClr val="tx1"/>
+        </a:solidFill>
+        <a:latin typeface="+mn-lt"/>
+        <a:ea typeface="+mn-ea"/>
+        <a:cs typeface="+mn-cs"/>
+      </a:defRPr>
+    </a:lvl8pPr>
+    <a:lvl9pPr marL="3657600" algn="l" defTabSz="914400" rtl="0" eaLnBrk="1" latinLnBrk="0" hangingPunct="1">
+      <a:defRPr sz="1200" kern="1200">
+        <a:solidFill>
+          <a:schemeClr val="tx1"/>
+        </a:solidFill>
+        <a:latin typeface="+mn-lt"/>
+        <a:ea typeface="+mn-ea"/>
+        <a:cs typeface="+mn-cs"/>
+      </a:defRPr>
+    </a:lvl9pPr>
+  </p:notesStyle>
+</p:notesMaster>
+</file>
+
+<file path=ppt/notesSlides/notesSlide1.xml><?xml version="1.0" encoding="utf-8"?>
+<p:notes xmlns:a="http://schemas.openxmlformats.org/drawingml/2006/main" xmlns:r="http://schemas.openxmlformats.org/officeDocument/2006/relationships" xmlns:p="http://schemas.openxmlformats.org/presentationml/2006/main">
+  <p:cSld>
+    <p:spTree>
+      <p:nvGrpSpPr>
+        <p:cNvPr id="1" name=""/>
+        <p:cNvGrpSpPr/>
+        <p:nvPr/>
+      </p:nvGrpSpPr>
+      <p:grpSpPr>
+        <a:xfrm>
+          <a:off x="0" y="0"/>
+          <a:ext cx="0" cy="0"/>
+          <a:chOff x="0" y="0"/>
+          <a:chExt cx="0" cy="0"/>
+        </a:xfrm>
+      </p:grpSpPr>
+      <p:sp>
+        <p:nvSpPr>
+          <p:cNvPr id="2" name="Slide Image Placeholder 1"/>
+          <p:cNvSpPr>
+            <a:spLocks noGrp="1" noRot="1" noChangeAspect="1"/>
+          </p:cNvSpPr>
+          <p:nvPr>
+            <p:ph type="sldImg"/>
+          </p:nvPr>
+        </p:nvSpPr>
+        <p:spPr/>
+      </p:sp>
+      <p:sp>
+        <p:nvSpPr>
+          <p:cNvPr id="3" name="Notes Placeholder 2"/>
+          <p:cNvSpPr>
+            <a:spLocks noGrp="1"/>
+          </p:cNvSpPr>
+          <p:nvPr>
+            <p:ph type="body" idx="1"/>
+          </p:nvPr>
+        </p:nvSpPr>
+        <p:spPr/>
+        <p:txBody>
+          <a:bodyPr/>
+          <a:lstStyle/>
+          <a:p>
+            <a:endParaRPr lang="en-US" dirty="0"/>
+          </a:p>
+        </p:txBody>
+      </p:sp>
+      <p:sp>
+        <p:nvSpPr>
+          <p:cNvPr id="4" name="Slide Number Placeholder 3"/>
+          <p:cNvSpPr>
+            <a:spLocks noGrp="1"/>
+          </p:cNvSpPr>
+          <p:nvPr>
+            <p:ph type="sldNum" sz="quarter" idx="10"/>
+          </p:nvPr>
+        </p:nvSpPr>
+        <p:spPr/>
+        <p:txBody>
+          <a:bodyPr/>
+          <a:lstStyle/>
+          <a:p>
+            <a:fld id="{26B33744-A8EE-4C3B-9A44-BACF3237857A}" type="slidenum">
+              <a:rPr lang="en-US" smtClean="0"/>
+              <a:t>6</a:t>
+            </a:fld>
+            <a:endParaRPr lang="en-US"/>
+          </a:p>
+        </p:txBody>
+      </p:sp>
+    </p:spTree>
+    <p:extLst>
+      <p:ext uri="{BB962C8B-B14F-4D97-AF65-F5344CB8AC3E}">
+        <p14:creationId xmlns:p14="http://schemas.microsoft.com/office/powerpoint/2010/main" val="3007121919"/>
+      </p:ext>
+    </p:extLst>
+  </p:cSld>
+  <p:clrMapOvr>
+    <a:masterClrMapping/>
+  </p:clrMapOvr>
+</p:notes>
 </file>
 
 <file path=ppt/slideLayouts/slideLayout1.xml><?xml version="1.0" encoding="utf-8"?>
@@ -241,7 +687,7 @@
           <a:p>
             <a:fld id="{E9906F21-2E47-4EB4-AA95-D11E765E2670}" type="datetimeFigureOut">
               <a:rPr lang="en-US" smtClean="0"/>
-              <a:t>10/19/2019</a:t>
+              <a:t>10/20/2019</a:t>
             </a:fld>
             <a:endParaRPr lang="en-US"/>
           </a:p>
@@ -411,7 +857,7 @@
           <a:p>
             <a:fld id="{E9906F21-2E47-4EB4-AA95-D11E765E2670}" type="datetimeFigureOut">
               <a:rPr lang="en-US" smtClean="0"/>
-              <a:t>10/19/2019</a:t>
+              <a:t>10/20/2019</a:t>
             </a:fld>
             <a:endParaRPr lang="en-US"/>
           </a:p>
@@ -591,7 +1037,7 @@
           <a:p>
             <a:fld id="{E9906F21-2E47-4EB4-AA95-D11E765E2670}" type="datetimeFigureOut">
               <a:rPr lang="en-US" smtClean="0"/>
-              <a:t>10/19/2019</a:t>
+              <a:t>10/20/2019</a:t>
             </a:fld>
             <a:endParaRPr lang="en-US"/>
           </a:p>
@@ -761,7 +1207,7 @@
           <a:p>
             <a:fld id="{E9906F21-2E47-4EB4-AA95-D11E765E2670}" type="datetimeFigureOut">
               <a:rPr lang="en-US" smtClean="0"/>
-              <a:t>10/19/2019</a:t>
+              <a:t>10/20/2019</a:t>
             </a:fld>
             <a:endParaRPr lang="en-US"/>
           </a:p>
@@ -1007,7 +1453,7 @@
           <a:p>
             <a:fld id="{E9906F21-2E47-4EB4-AA95-D11E765E2670}" type="datetimeFigureOut">
               <a:rPr lang="en-US" smtClean="0"/>
-              <a:t>10/19/2019</a:t>
+              <a:t>10/20/2019</a:t>
             </a:fld>
             <a:endParaRPr lang="en-US"/>
           </a:p>
@@ -1239,7 +1685,7 @@
           <a:p>
             <a:fld id="{E9906F21-2E47-4EB4-AA95-D11E765E2670}" type="datetimeFigureOut">
               <a:rPr lang="en-US" smtClean="0"/>
-              <a:t>10/19/2019</a:t>
+              <a:t>10/20/2019</a:t>
             </a:fld>
             <a:endParaRPr lang="en-US"/>
           </a:p>
@@ -1606,7 +2052,7 @@
           <a:p>
             <a:fld id="{E9906F21-2E47-4EB4-AA95-D11E765E2670}" type="datetimeFigureOut">
               <a:rPr lang="en-US" smtClean="0"/>
-              <a:t>10/19/2019</a:t>
+              <a:t>10/20/2019</a:t>
             </a:fld>
             <a:endParaRPr lang="en-US"/>
           </a:p>
@@ -1724,7 +2170,7 @@
           <a:p>
             <a:fld id="{E9906F21-2E47-4EB4-AA95-D11E765E2670}" type="datetimeFigureOut">
               <a:rPr lang="en-US" smtClean="0"/>
-              <a:t>10/19/2019</a:t>
+              <a:t>10/20/2019</a:t>
             </a:fld>
             <a:endParaRPr lang="en-US"/>
           </a:p>
@@ -1819,7 +2265,7 @@
           <a:p>
             <a:fld id="{E9906F21-2E47-4EB4-AA95-D11E765E2670}" type="datetimeFigureOut">
               <a:rPr lang="en-US" smtClean="0"/>
-              <a:t>10/19/2019</a:t>
+              <a:t>10/20/2019</a:t>
             </a:fld>
             <a:endParaRPr lang="en-US"/>
           </a:p>
@@ -2096,7 +2542,7 @@
           <a:p>
             <a:fld id="{E9906F21-2E47-4EB4-AA95-D11E765E2670}" type="datetimeFigureOut">
               <a:rPr lang="en-US" smtClean="0"/>
-              <a:t>10/19/2019</a:t>
+              <a:t>10/20/2019</a:t>
             </a:fld>
             <a:endParaRPr lang="en-US"/>
           </a:p>
@@ -2349,7 +2795,7 @@
           <a:p>
             <a:fld id="{E9906F21-2E47-4EB4-AA95-D11E765E2670}" type="datetimeFigureOut">
               <a:rPr lang="en-US" smtClean="0"/>
-              <a:t>10/19/2019</a:t>
+              <a:t>10/20/2019</a:t>
             </a:fld>
             <a:endParaRPr lang="en-US"/>
           </a:p>
@@ -2562,7 +3008,7 @@
           <a:p>
             <a:fld id="{E9906F21-2E47-4EB4-AA95-D11E765E2670}" type="datetimeFigureOut">
               <a:rPr lang="en-US" smtClean="0"/>
-              <a:t>10/19/2019</a:t>
+              <a:t>10/20/2019</a:t>
             </a:fld>
             <a:endParaRPr lang="en-US"/>
           </a:p>
@@ -3180,8 +3626,8 @@
         </p:nvSpPr>
         <p:spPr>
           <a:xfrm>
-            <a:off x="4815854" y="502952"/>
-            <a:ext cx="8433719" cy="5632311"/>
+            <a:off x="5059758" y="2122886"/>
+            <a:ext cx="6766486" cy="4524315"/>
           </a:xfrm>
           <a:prstGeom prst="rect">
             <a:avLst/>
@@ -3189,7 +3635,7 @@
           <a:noFill/>
         </p:spPr>
         <p:txBody>
-          <a:bodyPr wrap="none" rtlCol="0">
+          <a:bodyPr wrap="square" rtlCol="0">
             <a:spAutoFit/>
           </a:bodyPr>
           <a:lstStyle/>
@@ -3199,83 +3645,29 @@
                 <a:latin typeface="Roboto" panose="02000000000000000000" pitchFamily="2" charset="0"/>
                 <a:ea typeface="Roboto" panose="02000000000000000000" pitchFamily="2" charset="0"/>
               </a:rPr>
-              <a:t>Increase safety</a:t>
-            </a:r>
-          </a:p>
-          <a:p>
-            <a:r>
-              <a:rPr lang="en-US" sz="3600" dirty="0" smtClean="0">
-                <a:latin typeface="Roboto" panose="02000000000000000000" pitchFamily="2" charset="0"/>
-                <a:ea typeface="Roboto" panose="02000000000000000000" pitchFamily="2" charset="0"/>
-              </a:rPr>
-              <a:t>Real time information</a:t>
-            </a:r>
-          </a:p>
-          <a:p>
-            <a:r>
-              <a:rPr lang="en-US" sz="3600" dirty="0" smtClean="0">
-                <a:latin typeface="Roboto" panose="02000000000000000000" pitchFamily="2" charset="0"/>
-                <a:ea typeface="Roboto" panose="02000000000000000000" pitchFamily="2" charset="0"/>
-              </a:rPr>
-              <a:t>GPS denied</a:t>
-            </a:r>
-          </a:p>
-          <a:p>
-            <a:r>
-              <a:rPr lang="en-US" sz="3600" dirty="0" smtClean="0">
-                <a:latin typeface="Roboto" panose="02000000000000000000" pitchFamily="2" charset="0"/>
-                <a:ea typeface="Roboto" panose="02000000000000000000" pitchFamily="2" charset="0"/>
-              </a:rPr>
-              <a:t>Private</a:t>
-            </a:r>
-          </a:p>
-          <a:p>
-            <a:r>
-              <a:rPr lang="en-US" sz="3600" dirty="0" smtClean="0">
-                <a:latin typeface="Roboto" panose="02000000000000000000" pitchFamily="2" charset="0"/>
-                <a:ea typeface="Roboto" panose="02000000000000000000" pitchFamily="2" charset="0"/>
-              </a:rPr>
-              <a:t>Distributed</a:t>
-            </a:r>
-          </a:p>
-          <a:p>
-            <a:r>
-              <a:rPr lang="en-US" sz="3600" dirty="0" smtClean="0">
-                <a:latin typeface="Roboto" panose="02000000000000000000" pitchFamily="2" charset="0"/>
-                <a:ea typeface="Roboto" panose="02000000000000000000" pitchFamily="2" charset="0"/>
-              </a:rPr>
-              <a:t>Decentralized</a:t>
-            </a:r>
-          </a:p>
-          <a:p>
-            <a:r>
-              <a:rPr lang="en-US" sz="3600" dirty="0" smtClean="0">
-                <a:latin typeface="Roboto" panose="02000000000000000000" pitchFamily="2" charset="0"/>
-                <a:ea typeface="Roboto" panose="02000000000000000000" pitchFamily="2" charset="0"/>
-              </a:rPr>
-              <a:t>Road safety</a:t>
-            </a:r>
-          </a:p>
-          <a:p>
-            <a:r>
-              <a:rPr lang="en-US" sz="3600" dirty="0" smtClean="0">
-                <a:latin typeface="Roboto" panose="02000000000000000000" pitchFamily="2" charset="0"/>
-                <a:ea typeface="Roboto" panose="02000000000000000000" pitchFamily="2" charset="0"/>
-              </a:rPr>
-              <a:t>Anonymous</a:t>
-            </a:r>
-          </a:p>
-          <a:p>
-            <a:r>
-              <a:rPr lang="en-US" sz="3600" dirty="0" smtClean="0">
-                <a:latin typeface="Roboto" panose="02000000000000000000" pitchFamily="2" charset="0"/>
-                <a:ea typeface="Roboto" panose="02000000000000000000" pitchFamily="2" charset="0"/>
-              </a:rPr>
-              <a:t>No more private than looking at the road</a:t>
-            </a:r>
+              <a:t>Increase driving safety using real-time, non-invasive, and anonymous data communicated between cars and distributed relay centers. </a:t>
+            </a:r>
+          </a:p>
+          <a:p>
+            <a:endParaRPr lang="en-US" sz="3600" dirty="0" smtClean="0">
+              <a:latin typeface="Roboto" panose="02000000000000000000" pitchFamily="2" charset="0"/>
+              <a:ea typeface="Roboto" panose="02000000000000000000" pitchFamily="2" charset="0"/>
+            </a:endParaRPr>
+          </a:p>
+          <a:p>
+            <a:endParaRPr lang="en-US" sz="3600" dirty="0" smtClean="0">
+              <a:latin typeface="Roboto" panose="02000000000000000000" pitchFamily="2" charset="0"/>
+              <a:ea typeface="Roboto" panose="02000000000000000000" pitchFamily="2" charset="0"/>
+            </a:endParaRPr>
           </a:p>
           <a:p>
             <a:endParaRPr lang="en-US" sz="3600" dirty="0">
+              <a:latin typeface="Roboto" panose="02000000000000000000" pitchFamily="2" charset="0"/>
+              <a:ea typeface="Roboto" panose="02000000000000000000" pitchFamily="2" charset="0"/>
+            </a:endParaRPr>
+          </a:p>
+          <a:p>
+            <a:endParaRPr lang="en-US" sz="3600" dirty="0" smtClean="0">
               <a:latin typeface="Roboto" panose="02000000000000000000" pitchFamily="2" charset="0"/>
               <a:ea typeface="Roboto" panose="02000000000000000000" pitchFamily="2" charset="0"/>
             </a:endParaRPr>
@@ -3321,6 +3713,76 @@
           </a:extLst>
         </p:spPr>
       </p:pic>
+      <p:cxnSp>
+        <p:nvCxnSpPr>
+          <p:cNvPr id="4" name="Straight Connector 3"/>
+          <p:cNvCxnSpPr/>
+          <p:nvPr/>
+        </p:nvCxnSpPr>
+        <p:spPr>
+          <a:xfrm flipV="1">
+            <a:off x="883977" y="1965977"/>
+            <a:ext cx="10332607" cy="15684"/>
+          </a:xfrm>
+          <a:prstGeom prst="line">
+            <a:avLst/>
+          </a:prstGeom>
+          <a:ln w="28575">
+            <a:solidFill>
+              <a:srgbClr val="FF0000"/>
+            </a:solidFill>
+          </a:ln>
+        </p:spPr>
+        <p:style>
+          <a:lnRef idx="1">
+            <a:schemeClr val="dk1"/>
+          </a:lnRef>
+          <a:fillRef idx="0">
+            <a:schemeClr val="dk1"/>
+          </a:fillRef>
+          <a:effectRef idx="0">
+            <a:schemeClr val="dk1"/>
+          </a:effectRef>
+          <a:fontRef idx="minor">
+            <a:schemeClr val="tx1"/>
+          </a:fontRef>
+        </p:style>
+      </p:cxnSp>
+      <p:cxnSp>
+        <p:nvCxnSpPr>
+          <p:cNvPr id="10" name="Straight Connector 9"/>
+          <p:cNvCxnSpPr/>
+          <p:nvPr/>
+        </p:nvCxnSpPr>
+        <p:spPr>
+          <a:xfrm>
+            <a:off x="701099" y="4617707"/>
+            <a:ext cx="10515485" cy="0"/>
+          </a:xfrm>
+          <a:prstGeom prst="line">
+            <a:avLst/>
+          </a:prstGeom>
+          <a:ln w="28575">
+            <a:solidFill>
+              <a:srgbClr val="FF0000"/>
+            </a:solidFill>
+          </a:ln>
+        </p:spPr>
+        <p:style>
+          <a:lnRef idx="1">
+            <a:schemeClr val="dk1"/>
+          </a:lnRef>
+          <a:fillRef idx="0">
+            <a:schemeClr val="dk1"/>
+          </a:fillRef>
+          <a:effectRef idx="0">
+            <a:schemeClr val="dk1"/>
+          </a:effectRef>
+          <a:fontRef idx="minor">
+            <a:schemeClr val="tx1"/>
+          </a:fontRef>
+        </p:style>
+      </p:cxnSp>
     </p:spTree>
     <p:extLst>
       <p:ext uri="{BB962C8B-B14F-4D97-AF65-F5344CB8AC3E}">
@@ -3358,9 +3820,101 @@
           <a:chExt cx="0" cy="0"/>
         </a:xfrm>
       </p:grpSpPr>
+      <p:sp>
+        <p:nvSpPr>
+          <p:cNvPr id="2" name="Title 1"/>
+          <p:cNvSpPr>
+            <a:spLocks noGrp="1"/>
+          </p:cNvSpPr>
+          <p:nvPr>
+            <p:ph type="title"/>
+          </p:nvPr>
+        </p:nvSpPr>
+        <p:spPr>
+          <a:xfrm>
+            <a:off x="335343" y="320074"/>
+            <a:ext cx="7178020" cy="1325563"/>
+          </a:xfrm>
+        </p:spPr>
+        <p:txBody>
+          <a:bodyPr>
+            <a:normAutofit/>
+          </a:bodyPr>
+          <a:lstStyle/>
+          <a:p>
+            <a:r>
+              <a:rPr lang="en-US" sz="7200" dirty="0" smtClean="0">
+                <a:latin typeface="Roboto Medium" panose="02000000000000000000" pitchFamily="2" charset="0"/>
+                <a:ea typeface="Roboto Medium" panose="02000000000000000000" pitchFamily="2" charset="0"/>
+              </a:rPr>
+              <a:t>Our Pledge</a:t>
+            </a:r>
+            <a:endParaRPr lang="en-US" sz="7200" dirty="0">
+              <a:latin typeface="Roboto Medium" panose="02000000000000000000" pitchFamily="2" charset="0"/>
+              <a:ea typeface="Roboto Medium" panose="02000000000000000000" pitchFamily="2" charset="0"/>
+            </a:endParaRPr>
+          </a:p>
+        </p:txBody>
+      </p:sp>
+      <p:sp>
+        <p:nvSpPr>
+          <p:cNvPr id="3" name="Content Placeholder 2"/>
+          <p:cNvSpPr>
+            <a:spLocks noGrp="1"/>
+          </p:cNvSpPr>
+          <p:nvPr>
+            <p:ph idx="1"/>
+          </p:nvPr>
+        </p:nvSpPr>
+        <p:spPr>
+          <a:xfrm>
+            <a:off x="4831059" y="2331732"/>
+            <a:ext cx="6370320" cy="5212023"/>
+          </a:xfrm>
+        </p:spPr>
+        <p:txBody>
+          <a:bodyPr>
+            <a:normAutofit/>
+          </a:bodyPr>
+          <a:lstStyle/>
+          <a:p>
+            <a:pPr marL="0" indent="0">
+              <a:buNone/>
+            </a:pPr>
+            <a:r>
+              <a:rPr lang="en-US" sz="3600" dirty="0">
+                <a:latin typeface="Roboto" panose="02000000000000000000" pitchFamily="2" charset="0"/>
+                <a:ea typeface="Roboto" panose="02000000000000000000" pitchFamily="2" charset="0"/>
+              </a:rPr>
+              <a:t>Country Road strives to ensure </a:t>
+            </a:r>
+            <a:r>
+              <a:rPr lang="en-US" sz="3600" dirty="0" smtClean="0">
+                <a:latin typeface="Roboto" panose="02000000000000000000" pitchFamily="2" charset="0"/>
+                <a:ea typeface="Roboto" panose="02000000000000000000" pitchFamily="2" charset="0"/>
+              </a:rPr>
+              <a:t>collected data </a:t>
+            </a:r>
+            <a:r>
+              <a:rPr lang="en-US" sz="3600" dirty="0">
+                <a:latin typeface="Roboto" panose="02000000000000000000" pitchFamily="2" charset="0"/>
+                <a:ea typeface="Roboto" panose="02000000000000000000" pitchFamily="2" charset="0"/>
+              </a:rPr>
+              <a:t>is no more specific than someone could collect standing on the side of the road</a:t>
+            </a:r>
+            <a:r>
+              <a:rPr lang="en-US" sz="3600" dirty="0" smtClean="0">
+                <a:latin typeface="Roboto" panose="02000000000000000000" pitchFamily="2" charset="0"/>
+                <a:ea typeface="Roboto" panose="02000000000000000000" pitchFamily="2" charset="0"/>
+              </a:rPr>
+              <a:t>.</a:t>
+            </a:r>
+          </a:p>
+        </p:txBody>
+      </p:sp>
       <p:pic>
         <p:nvPicPr>
-          <p:cNvPr id="3" name="Picture 2"/>
+          <p:cNvPr id="4" name="Picture 3"/>
           <p:cNvPicPr>
             <a:picLocks noChangeAspect="1"/>
           </p:cNvPicPr>
@@ -3388,46 +3942,40 @@
           </a:prstGeom>
         </p:spPr>
       </p:pic>
-      <p:sp>
-        <p:nvSpPr>
-          <p:cNvPr id="8" name="TextBox 7"/>
-          <p:cNvSpPr txBox="1"/>
+      <p:pic>
+        <p:nvPicPr>
+          <p:cNvPr id="5" name="Picture 4"/>
+          <p:cNvPicPr>
+            <a:picLocks noChangeAspect="1"/>
+          </p:cNvPicPr>
           <p:nvPr/>
-        </p:nvSpPr>
-        <p:spPr>
-          <a:xfrm>
-            <a:off x="335343" y="228635"/>
-            <a:ext cx="11691021" cy="1200329"/>
+        </p:nvPicPr>
+        <p:blipFill>
+          <a:blip r:embed="rId3" cstate="print">
+            <a:extLst>
+              <a:ext uri="{28A0092B-C50C-407E-A947-70E740481C1C}">
+                <a14:useLocalDpi xmlns:a14="http://schemas.microsoft.com/office/drawing/2010/main" val="0"/>
+              </a:ext>
+            </a:extLst>
+          </a:blip>
+          <a:stretch>
+            <a:fillRect/>
+          </a:stretch>
+        </p:blipFill>
+        <p:spPr>
+          <a:xfrm>
+            <a:off x="1249732" y="1965975"/>
+            <a:ext cx="3059753" cy="3566121"/>
           </a:xfrm>
           <a:prstGeom prst="rect">
             <a:avLst/>
           </a:prstGeom>
-          <a:noFill/>
-        </p:spPr>
-        <p:txBody>
-          <a:bodyPr wrap="none" rtlCol="0">
-            <a:spAutoFit/>
-          </a:bodyPr>
-          <a:lstStyle/>
-          <a:p>
-            <a:r>
-              <a:rPr lang="en-US" sz="7200" dirty="0" smtClean="0">
-                <a:latin typeface="Roboto Medium" panose="02000000000000000000" pitchFamily="2" charset="0"/>
-                <a:ea typeface="Roboto Medium" panose="02000000000000000000" pitchFamily="2" charset="0"/>
-              </a:rPr>
-              <a:t>The Country Roads Solution</a:t>
-            </a:r>
-            <a:endParaRPr lang="en-US" sz="7200" dirty="0">
-              <a:latin typeface="Roboto Medium" panose="02000000000000000000" pitchFamily="2" charset="0"/>
-              <a:ea typeface="Roboto Medium" panose="02000000000000000000" pitchFamily="2" charset="0"/>
-            </a:endParaRPr>
-          </a:p>
-        </p:txBody>
-      </p:sp>
+        </p:spPr>
+      </p:pic>
     </p:spTree>
     <p:extLst>
       <p:ext uri="{BB962C8B-B14F-4D97-AF65-F5344CB8AC3E}">
-        <p14:creationId xmlns:p14="http://schemas.microsoft.com/office/powerpoint/2010/main" val="1999807027"/>
+        <p14:creationId xmlns:p14="http://schemas.microsoft.com/office/powerpoint/2010/main" val="1320238154"/>
       </p:ext>
     </p:extLst>
   </p:cSld>
@@ -3500,7 +4048,7 @@
         <p:spPr>
           <a:xfrm>
             <a:off x="335343" y="228635"/>
-            <a:ext cx="4693914" cy="1200329"/>
+            <a:ext cx="7975581" cy="1200329"/>
           </a:xfrm>
           <a:prstGeom prst="rect">
             <a:avLst/>
@@ -3518,7 +4066,14 @@
                 <a:latin typeface="Roboto Medium" panose="02000000000000000000" pitchFamily="2" charset="0"/>
                 <a:ea typeface="Roboto Medium" panose="02000000000000000000" pitchFamily="2" charset="0"/>
               </a:rPr>
-              <a:t>Next Steps</a:t>
+              <a:t>The Country Roads </a:t>
+            </a:r>
+            <a:r>
+              <a:rPr lang="en-US" sz="7200" dirty="0" smtClean="0">
+                <a:latin typeface="Roboto Medium" panose="02000000000000000000" pitchFamily="2" charset="0"/>
+                <a:ea typeface="Roboto Medium" panose="02000000000000000000" pitchFamily="2" charset="0"/>
+              </a:rPr>
+              <a:t>Way</a:t>
             </a:r>
             <a:endParaRPr lang="en-US" sz="7200" dirty="0">
               <a:latin typeface="Roboto Medium" panose="02000000000000000000" pitchFamily="2" charset="0"/>
@@ -3527,6 +4082,2184 @@
           </a:p>
         </p:txBody>
       </p:sp>
+      <p:pic>
+        <p:nvPicPr>
+          <p:cNvPr id="3074" name="Picture 2" descr="https://scontent.fbed1-1.fna.fbcdn.net/v/t1.15752-9/75380267_677214232687349_8723629674019684352_n.png?_nc_cat=100&amp;_nc_oc=AQnPzhqeovxYYUIPt8sOnC6FsztRBbIcUD_0WElK72eI6JHNobdeLRWQ9MFdKaoWH3U&amp;_nc_ht=scontent.fbed1-1.fna&amp;oh=e697f3ceec5235d45ada814a23c10163&amp;oe=5E5A8A84"/>
+          <p:cNvPicPr>
+            <a:picLocks noChangeAspect="1" noChangeArrowheads="1"/>
+          </p:cNvPicPr>
+          <p:nvPr/>
+        </p:nvPicPr>
+        <p:blipFill>
+          <a:blip r:embed="rId3">
+            <a:extLst>
+              <a:ext uri="{28A0092B-C50C-407E-A947-70E740481C1C}">
+                <a14:useLocalDpi xmlns:a14="http://schemas.microsoft.com/office/drawing/2010/main" val="0"/>
+              </a:ext>
+            </a:extLst>
+          </a:blip>
+          <a:srcRect/>
+          <a:stretch>
+            <a:fillRect/>
+          </a:stretch>
+        </p:blipFill>
+        <p:spPr bwMode="auto">
+          <a:xfrm>
+            <a:off x="299894" y="1600219"/>
+            <a:ext cx="8686510" cy="4297633"/>
+          </a:xfrm>
+          <a:prstGeom prst="rect">
+            <a:avLst/>
+          </a:prstGeom>
+          <a:noFill/>
+          <a:extLst>
+            <a:ext uri="{909E8E84-426E-40DD-AFC4-6F175D3DCCD1}">
+              <a14:hiddenFill xmlns:a14="http://schemas.microsoft.com/office/drawing/2010/main">
+                <a:solidFill>
+                  <a:srgbClr val="FFFFFF"/>
+                </a:solidFill>
+              </a14:hiddenFill>
+            </a:ext>
+          </a:extLst>
+        </p:spPr>
+      </p:pic>
+      <p:sp>
+        <p:nvSpPr>
+          <p:cNvPr id="4" name="TextBox 3"/>
+          <p:cNvSpPr txBox="1"/>
+          <p:nvPr/>
+        </p:nvSpPr>
+        <p:spPr>
+          <a:xfrm>
+            <a:off x="9054343" y="1466118"/>
+            <a:ext cx="2664127" cy="1754326"/>
+          </a:xfrm>
+          <a:prstGeom prst="rect">
+            <a:avLst/>
+          </a:prstGeom>
+          <a:noFill/>
+        </p:spPr>
+        <p:txBody>
+          <a:bodyPr wrap="none" rtlCol="0">
+            <a:spAutoFit/>
+          </a:bodyPr>
+          <a:lstStyle/>
+          <a:p>
+            <a:r>
+              <a:rPr lang="en-US" sz="3600" dirty="0" smtClean="0">
+                <a:latin typeface="Roboto Medium" panose="02000000000000000000"/>
+              </a:rPr>
+              <a:t>Relay Location:</a:t>
+            </a:r>
+            <a:endParaRPr lang="en-US" sz="3600" dirty="0">
+              <a:latin typeface="Roboto Medium" panose="02000000000000000000"/>
+            </a:endParaRPr>
+          </a:p>
+          <a:p>
+            <a:pPr marL="571500" indent="-571500">
+              <a:buFont typeface="Arial" panose="020B0604020202020204" pitchFamily="34" charset="0"/>
+              <a:buChar char="•"/>
+            </a:pPr>
+            <a:r>
+              <a:rPr lang="en-US" sz="2400" dirty="0" smtClean="0">
+                <a:latin typeface="Roboto Medium" panose="02000000000000000000"/>
+              </a:rPr>
+              <a:t>Station Name</a:t>
+            </a:r>
+          </a:p>
+          <a:p>
+            <a:pPr marL="571500" indent="-571500">
+              <a:buFont typeface="Arial" panose="020B0604020202020204" pitchFamily="34" charset="0"/>
+              <a:buChar char="•"/>
+            </a:pPr>
+            <a:r>
+              <a:rPr lang="en-US" sz="2400" dirty="0" smtClean="0">
+                <a:latin typeface="Roboto Medium" panose="02000000000000000000"/>
+              </a:rPr>
+              <a:t>Station Number</a:t>
+            </a:r>
+          </a:p>
+          <a:p>
+            <a:pPr marL="571500" indent="-571500">
+              <a:buFont typeface="Arial" panose="020B0604020202020204" pitchFamily="34" charset="0"/>
+              <a:buChar char="•"/>
+            </a:pPr>
+            <a:r>
+              <a:rPr lang="en-US" sz="2400" dirty="0" smtClean="0">
+                <a:latin typeface="Roboto Medium" panose="02000000000000000000"/>
+              </a:rPr>
+              <a:t>Street Name</a:t>
+            </a:r>
+            <a:endParaRPr lang="en-US" sz="2400" dirty="0">
+              <a:latin typeface="Roboto Medium" panose="02000000000000000000"/>
+            </a:endParaRPr>
+          </a:p>
+        </p:txBody>
+      </p:sp>
+      <p:sp>
+        <p:nvSpPr>
+          <p:cNvPr id="7" name="TextBox 6"/>
+          <p:cNvSpPr txBox="1"/>
+          <p:nvPr/>
+        </p:nvSpPr>
+        <p:spPr>
+          <a:xfrm>
+            <a:off x="9054343" y="3220444"/>
+            <a:ext cx="2326855" cy="2862322"/>
+          </a:xfrm>
+          <a:prstGeom prst="rect">
+            <a:avLst/>
+          </a:prstGeom>
+          <a:noFill/>
+        </p:spPr>
+        <p:txBody>
+          <a:bodyPr wrap="none" rtlCol="0">
+            <a:spAutoFit/>
+          </a:bodyPr>
+          <a:lstStyle/>
+          <a:p>
+            <a:r>
+              <a:rPr lang="en-US" sz="3600" dirty="0" smtClean="0">
+                <a:latin typeface="Roboto Medium" panose="02000000000000000000"/>
+              </a:rPr>
+              <a:t>Car Info:</a:t>
+            </a:r>
+          </a:p>
+          <a:p>
+            <a:pPr marL="457200" indent="-457200">
+              <a:buFont typeface="Arial" panose="020B0604020202020204" pitchFamily="34" charset="0"/>
+              <a:buChar char="•"/>
+            </a:pPr>
+            <a:r>
+              <a:rPr lang="en-US" sz="2400" dirty="0" smtClean="0">
+                <a:latin typeface="Roboto Medium" panose="02000000000000000000"/>
+              </a:rPr>
+              <a:t>Color</a:t>
+            </a:r>
+          </a:p>
+          <a:p>
+            <a:pPr marL="457200" indent="-457200">
+              <a:buFont typeface="Arial" panose="020B0604020202020204" pitchFamily="34" charset="0"/>
+              <a:buChar char="•"/>
+            </a:pPr>
+            <a:r>
+              <a:rPr lang="en-US" sz="2400" dirty="0" smtClean="0">
+                <a:latin typeface="Roboto Medium" panose="02000000000000000000"/>
+              </a:rPr>
+              <a:t>ID</a:t>
+            </a:r>
+          </a:p>
+          <a:p>
+            <a:pPr marL="457200" indent="-457200">
+              <a:buFont typeface="Arial" panose="020B0604020202020204" pitchFamily="34" charset="0"/>
+              <a:buChar char="•"/>
+            </a:pPr>
+            <a:r>
+              <a:rPr lang="en-US" sz="2400" dirty="0" smtClean="0">
+                <a:latin typeface="Roboto Medium" panose="02000000000000000000"/>
+              </a:rPr>
+              <a:t>Speed</a:t>
+            </a:r>
+          </a:p>
+          <a:p>
+            <a:pPr marL="457200" indent="-457200">
+              <a:buFont typeface="Arial" panose="020B0604020202020204" pitchFamily="34" charset="0"/>
+              <a:buChar char="•"/>
+            </a:pPr>
+            <a:r>
+              <a:rPr lang="en-US" sz="2400" dirty="0" smtClean="0">
+                <a:latin typeface="Roboto Medium" panose="02000000000000000000"/>
+              </a:rPr>
+              <a:t>Fuel Level</a:t>
+            </a:r>
+          </a:p>
+          <a:p>
+            <a:pPr marL="457200" indent="-457200">
+              <a:buFont typeface="Arial" panose="020B0604020202020204" pitchFamily="34" charset="0"/>
+              <a:buChar char="•"/>
+            </a:pPr>
+            <a:r>
+              <a:rPr lang="en-US" sz="2400" dirty="0" smtClean="0">
+                <a:latin typeface="Roboto Medium" panose="02000000000000000000"/>
+              </a:rPr>
+              <a:t>Travel Direction</a:t>
+            </a:r>
+          </a:p>
+          <a:p>
+            <a:pPr marL="457200" indent="-457200">
+              <a:buFont typeface="Arial" panose="020B0604020202020204" pitchFamily="34" charset="0"/>
+              <a:buChar char="•"/>
+            </a:pPr>
+            <a:r>
+              <a:rPr lang="en-US" sz="2400" dirty="0" smtClean="0">
+                <a:latin typeface="Roboto Medium" panose="02000000000000000000"/>
+              </a:rPr>
+              <a:t>Timestamp</a:t>
+            </a:r>
+            <a:endParaRPr lang="en-US" sz="2400" dirty="0">
+              <a:latin typeface="Roboto Medium" panose="02000000000000000000"/>
+            </a:endParaRPr>
+          </a:p>
+        </p:txBody>
+      </p:sp>
+    </p:spTree>
+    <p:extLst>
+      <p:ext uri="{BB962C8B-B14F-4D97-AF65-F5344CB8AC3E}">
+        <p14:creationId xmlns:p14="http://schemas.microsoft.com/office/powerpoint/2010/main" val="1999807027"/>
+      </p:ext>
+    </p:extLst>
+  </p:cSld>
+  <p:clrMapOvr>
+    <a:masterClrMapping/>
+  </p:clrMapOvr>
+  <p:timing>
+    <p:tnLst>
+      <p:par>
+        <p:cTn id="1" dur="indefinite" restart="never" nodeType="tmRoot"/>
+      </p:par>
+    </p:tnLst>
+  </p:timing>
+</p:sld>
+</file>
+
+<file path=ppt/slides/slide5.xml><?xml version="1.0" encoding="utf-8"?>
+<p:sld xmlns:a="http://schemas.openxmlformats.org/drawingml/2006/main" xmlns:r="http://schemas.openxmlformats.org/officeDocument/2006/relationships" xmlns:p="http://schemas.openxmlformats.org/presentationml/2006/main">
+  <p:cSld>
+    <p:spTree>
+      <p:nvGrpSpPr>
+        <p:cNvPr id="1" name=""/>
+        <p:cNvGrpSpPr/>
+        <p:nvPr/>
+      </p:nvGrpSpPr>
+      <p:grpSpPr>
+        <a:xfrm>
+          <a:off x="0" y="0"/>
+          <a:ext cx="0" cy="0"/>
+          <a:chOff x="0" y="0"/>
+          <a:chExt cx="0" cy="0"/>
+        </a:xfrm>
+      </p:grpSpPr>
+      <p:sp>
+        <p:nvSpPr>
+          <p:cNvPr id="4" name="TextBox 3"/>
+          <p:cNvSpPr txBox="1"/>
+          <p:nvPr/>
+        </p:nvSpPr>
+        <p:spPr>
+          <a:xfrm>
+            <a:off x="335343" y="228635"/>
+            <a:ext cx="6092630" cy="1200329"/>
+          </a:xfrm>
+          <a:prstGeom prst="rect">
+            <a:avLst/>
+          </a:prstGeom>
+          <a:noFill/>
+        </p:spPr>
+        <p:txBody>
+          <a:bodyPr wrap="none" rtlCol="0">
+            <a:spAutoFit/>
+          </a:bodyPr>
+          <a:lstStyle/>
+          <a:p>
+            <a:r>
+              <a:rPr lang="en-US" sz="7200" dirty="0" smtClean="0">
+                <a:latin typeface="Roboto Medium" panose="02000000000000000000" pitchFamily="2" charset="0"/>
+                <a:ea typeface="Roboto Medium" panose="02000000000000000000" pitchFamily="2" charset="0"/>
+              </a:rPr>
+              <a:t>Our Secret Recipe</a:t>
+            </a:r>
+            <a:endParaRPr lang="en-US" sz="7200" dirty="0">
+              <a:latin typeface="Roboto Medium" panose="02000000000000000000" pitchFamily="2" charset="0"/>
+              <a:ea typeface="Roboto Medium" panose="02000000000000000000" pitchFamily="2" charset="0"/>
+            </a:endParaRPr>
+          </a:p>
+        </p:txBody>
+      </p:sp>
+      <p:sp>
+        <p:nvSpPr>
+          <p:cNvPr id="5" name="Oval 4"/>
+          <p:cNvSpPr/>
+          <p:nvPr/>
+        </p:nvSpPr>
+        <p:spPr>
+          <a:xfrm>
+            <a:off x="4865871" y="2876748"/>
+            <a:ext cx="2011658" cy="1097268"/>
+          </a:xfrm>
+          <a:prstGeom prst="ellipse">
+            <a:avLst/>
+          </a:prstGeom>
+          <a:solidFill>
+            <a:schemeClr val="tx1"/>
+          </a:solidFill>
+        </p:spPr>
+        <p:style>
+          <a:lnRef idx="2">
+            <a:schemeClr val="accent1">
+              <a:shade val="50000"/>
+            </a:schemeClr>
+          </a:lnRef>
+          <a:fillRef idx="1">
+            <a:schemeClr val="accent1"/>
+          </a:fillRef>
+          <a:effectRef idx="0">
+            <a:schemeClr val="accent1"/>
+          </a:effectRef>
+          <a:fontRef idx="minor">
+            <a:schemeClr val="lt1"/>
+          </a:fontRef>
+        </p:style>
+        <p:txBody>
+          <a:bodyPr rtlCol="0" anchor="ctr"/>
+          <a:lstStyle/>
+          <a:p>
+            <a:pPr algn="ctr"/>
+            <a:r>
+              <a:rPr lang="en-US" sz="4400" dirty="0" smtClean="0"/>
+              <a:t>Relay</a:t>
+            </a:r>
+            <a:endParaRPr lang="en-US" sz="4400" dirty="0"/>
+          </a:p>
+        </p:txBody>
+      </p:sp>
+      <p:sp>
+        <p:nvSpPr>
+          <p:cNvPr id="6" name="Rectangle 5"/>
+          <p:cNvSpPr/>
+          <p:nvPr/>
+        </p:nvSpPr>
+        <p:spPr>
+          <a:xfrm>
+            <a:off x="2328558" y="1428964"/>
+            <a:ext cx="2011658" cy="1097268"/>
+          </a:xfrm>
+          <a:prstGeom prst="rect">
+            <a:avLst/>
+          </a:prstGeom>
+          <a:solidFill>
+            <a:srgbClr val="0070C0"/>
+          </a:solidFill>
+          <a:ln>
+            <a:solidFill>
+              <a:schemeClr val="tx1"/>
+            </a:solidFill>
+          </a:ln>
+        </p:spPr>
+        <p:style>
+          <a:lnRef idx="2">
+            <a:schemeClr val="accent1">
+              <a:shade val="50000"/>
+            </a:schemeClr>
+          </a:lnRef>
+          <a:fillRef idx="1">
+            <a:schemeClr val="accent1"/>
+          </a:fillRef>
+          <a:effectRef idx="0">
+            <a:schemeClr val="accent1"/>
+          </a:effectRef>
+          <a:fontRef idx="minor">
+            <a:schemeClr val="lt1"/>
+          </a:fontRef>
+        </p:style>
+        <p:txBody>
+          <a:bodyPr rtlCol="0" anchor="ctr"/>
+          <a:lstStyle/>
+          <a:p>
+            <a:pPr algn="ctr"/>
+            <a:r>
+              <a:rPr lang="en-US" sz="4400" dirty="0" smtClean="0"/>
+              <a:t>Car</a:t>
+            </a:r>
+            <a:endParaRPr lang="en-US" sz="3200" dirty="0"/>
+          </a:p>
+        </p:txBody>
+      </p:sp>
+      <p:sp>
+        <p:nvSpPr>
+          <p:cNvPr id="7" name="Rectangle 6"/>
+          <p:cNvSpPr/>
+          <p:nvPr/>
+        </p:nvSpPr>
+        <p:spPr>
+          <a:xfrm>
+            <a:off x="7647117" y="1328112"/>
+            <a:ext cx="2011658" cy="1097268"/>
+          </a:xfrm>
+          <a:prstGeom prst="rect">
+            <a:avLst/>
+          </a:prstGeom>
+          <a:solidFill>
+            <a:schemeClr val="accent4"/>
+          </a:solidFill>
+          <a:ln>
+            <a:solidFill>
+              <a:schemeClr val="tx1"/>
+            </a:solidFill>
+          </a:ln>
+        </p:spPr>
+        <p:style>
+          <a:lnRef idx="2">
+            <a:schemeClr val="accent1">
+              <a:shade val="50000"/>
+            </a:schemeClr>
+          </a:lnRef>
+          <a:fillRef idx="1">
+            <a:schemeClr val="accent1"/>
+          </a:fillRef>
+          <a:effectRef idx="0">
+            <a:schemeClr val="accent1"/>
+          </a:effectRef>
+          <a:fontRef idx="minor">
+            <a:schemeClr val="lt1"/>
+          </a:fontRef>
+        </p:style>
+        <p:txBody>
+          <a:bodyPr rtlCol="0" anchor="ctr"/>
+          <a:lstStyle/>
+          <a:p>
+            <a:pPr algn="ctr"/>
+            <a:r>
+              <a:rPr lang="en-US" sz="4400" dirty="0" smtClean="0"/>
+              <a:t>Car</a:t>
+            </a:r>
+            <a:endParaRPr lang="en-US" sz="3200" dirty="0"/>
+          </a:p>
+        </p:txBody>
+      </p:sp>
+      <p:sp>
+        <p:nvSpPr>
+          <p:cNvPr id="8" name="Oval 7"/>
+          <p:cNvSpPr/>
+          <p:nvPr/>
+        </p:nvSpPr>
+        <p:spPr>
+          <a:xfrm>
+            <a:off x="15293" y="2948799"/>
+            <a:ext cx="2011658" cy="1097268"/>
+          </a:xfrm>
+          <a:prstGeom prst="ellipse">
+            <a:avLst/>
+          </a:prstGeom>
+          <a:solidFill>
+            <a:schemeClr val="tx1"/>
+          </a:solidFill>
+        </p:spPr>
+        <p:style>
+          <a:lnRef idx="2">
+            <a:schemeClr val="accent1">
+              <a:shade val="50000"/>
+            </a:schemeClr>
+          </a:lnRef>
+          <a:fillRef idx="1">
+            <a:schemeClr val="accent1"/>
+          </a:fillRef>
+          <a:effectRef idx="0">
+            <a:schemeClr val="accent1"/>
+          </a:effectRef>
+          <a:fontRef idx="minor">
+            <a:schemeClr val="lt1"/>
+          </a:fontRef>
+        </p:style>
+        <p:txBody>
+          <a:bodyPr rtlCol="0" anchor="ctr"/>
+          <a:lstStyle/>
+          <a:p>
+            <a:pPr algn="ctr"/>
+            <a:r>
+              <a:rPr lang="en-US" sz="4400" dirty="0" smtClean="0"/>
+              <a:t>Relay</a:t>
+            </a:r>
+            <a:endParaRPr lang="en-US" sz="4400" dirty="0"/>
+          </a:p>
+        </p:txBody>
+      </p:sp>
+      <p:sp>
+        <p:nvSpPr>
+          <p:cNvPr id="9" name="Oval 8"/>
+          <p:cNvSpPr/>
+          <p:nvPr/>
+        </p:nvSpPr>
+        <p:spPr>
+          <a:xfrm>
+            <a:off x="9414842" y="2863317"/>
+            <a:ext cx="2011658" cy="1097268"/>
+          </a:xfrm>
+          <a:prstGeom prst="ellipse">
+            <a:avLst/>
+          </a:prstGeom>
+          <a:solidFill>
+            <a:schemeClr val="tx1"/>
+          </a:solidFill>
+        </p:spPr>
+        <p:style>
+          <a:lnRef idx="2">
+            <a:schemeClr val="accent1">
+              <a:shade val="50000"/>
+            </a:schemeClr>
+          </a:lnRef>
+          <a:fillRef idx="1">
+            <a:schemeClr val="accent1"/>
+          </a:fillRef>
+          <a:effectRef idx="0">
+            <a:schemeClr val="accent1"/>
+          </a:effectRef>
+          <a:fontRef idx="minor">
+            <a:schemeClr val="lt1"/>
+          </a:fontRef>
+        </p:style>
+        <p:txBody>
+          <a:bodyPr rtlCol="0" anchor="ctr"/>
+          <a:lstStyle/>
+          <a:p>
+            <a:pPr algn="ctr"/>
+            <a:r>
+              <a:rPr lang="en-US" sz="4400" dirty="0" smtClean="0"/>
+              <a:t>Relay</a:t>
+            </a:r>
+            <a:endParaRPr lang="en-US" sz="4400" dirty="0"/>
+          </a:p>
+        </p:txBody>
+      </p:sp>
+      <p:sp>
+        <p:nvSpPr>
+          <p:cNvPr id="10" name="Oval 9"/>
+          <p:cNvSpPr/>
+          <p:nvPr/>
+        </p:nvSpPr>
+        <p:spPr>
+          <a:xfrm>
+            <a:off x="1494141" y="4594701"/>
+            <a:ext cx="3596599" cy="1523985"/>
+          </a:xfrm>
+          <a:prstGeom prst="ellipse">
+            <a:avLst/>
+          </a:prstGeom>
+          <a:solidFill>
+            <a:schemeClr val="tx1"/>
+          </a:solidFill>
+        </p:spPr>
+        <p:style>
+          <a:lnRef idx="2">
+            <a:schemeClr val="accent1">
+              <a:shade val="50000"/>
+            </a:schemeClr>
+          </a:lnRef>
+          <a:fillRef idx="1">
+            <a:schemeClr val="accent1"/>
+          </a:fillRef>
+          <a:effectRef idx="0">
+            <a:schemeClr val="accent1"/>
+          </a:effectRef>
+          <a:fontRef idx="minor">
+            <a:schemeClr val="lt1"/>
+          </a:fontRef>
+        </p:style>
+        <p:txBody>
+          <a:bodyPr rtlCol="0" anchor="ctr"/>
+          <a:lstStyle/>
+          <a:p>
+            <a:pPr algn="ctr"/>
+            <a:r>
+              <a:rPr lang="en-US" sz="4400" dirty="0" smtClean="0"/>
+              <a:t>Requester</a:t>
+            </a:r>
+            <a:endParaRPr lang="en-US" sz="4400" dirty="0"/>
+          </a:p>
+        </p:txBody>
+      </p:sp>
+      <p:sp>
+        <p:nvSpPr>
+          <p:cNvPr id="11" name="Rectangle 10"/>
+          <p:cNvSpPr/>
+          <p:nvPr/>
+        </p:nvSpPr>
+        <p:spPr>
+          <a:xfrm>
+            <a:off x="5918544" y="4808059"/>
+            <a:ext cx="2377414" cy="1097268"/>
+          </a:xfrm>
+          <a:prstGeom prst="rect">
+            <a:avLst/>
+          </a:prstGeom>
+          <a:solidFill>
+            <a:schemeClr val="accent2"/>
+          </a:solidFill>
+          <a:ln>
+            <a:solidFill>
+              <a:schemeClr val="tx1"/>
+            </a:solidFill>
+          </a:ln>
+        </p:spPr>
+        <p:style>
+          <a:lnRef idx="2">
+            <a:schemeClr val="accent1">
+              <a:shade val="50000"/>
+            </a:schemeClr>
+          </a:lnRef>
+          <a:fillRef idx="1">
+            <a:schemeClr val="accent1"/>
+          </a:fillRef>
+          <a:effectRef idx="0">
+            <a:schemeClr val="accent1"/>
+          </a:effectRef>
+          <a:fontRef idx="minor">
+            <a:schemeClr val="lt1"/>
+          </a:fontRef>
+        </p:style>
+        <p:txBody>
+          <a:bodyPr rtlCol="0" anchor="ctr"/>
+          <a:lstStyle/>
+          <a:p>
+            <a:pPr algn="ctr"/>
+            <a:r>
+              <a:rPr lang="en-US" sz="4400" dirty="0" smtClean="0"/>
+              <a:t>Database</a:t>
+            </a:r>
+            <a:endParaRPr lang="en-US" sz="3200" dirty="0"/>
+          </a:p>
+        </p:txBody>
+      </p:sp>
+      <p:sp>
+        <p:nvSpPr>
+          <p:cNvPr id="12" name="Rectangle 11"/>
+          <p:cNvSpPr/>
+          <p:nvPr/>
+        </p:nvSpPr>
+        <p:spPr>
+          <a:xfrm>
+            <a:off x="9414842" y="4808059"/>
+            <a:ext cx="2011658" cy="1097268"/>
+          </a:xfrm>
+          <a:prstGeom prst="rect">
+            <a:avLst/>
+          </a:prstGeom>
+          <a:solidFill>
+            <a:srgbClr val="7030A0"/>
+          </a:solidFill>
+          <a:ln>
+            <a:solidFill>
+              <a:schemeClr val="tx1"/>
+            </a:solidFill>
+          </a:ln>
+        </p:spPr>
+        <p:style>
+          <a:lnRef idx="2">
+            <a:schemeClr val="accent1">
+              <a:shade val="50000"/>
+            </a:schemeClr>
+          </a:lnRef>
+          <a:fillRef idx="1">
+            <a:schemeClr val="accent1"/>
+          </a:fillRef>
+          <a:effectRef idx="0">
+            <a:schemeClr val="accent1"/>
+          </a:effectRef>
+          <a:fontRef idx="minor">
+            <a:schemeClr val="lt1"/>
+          </a:fontRef>
+        </p:style>
+        <p:txBody>
+          <a:bodyPr rtlCol="0" anchor="ctr"/>
+          <a:lstStyle/>
+          <a:p>
+            <a:pPr algn="ctr"/>
+            <a:r>
+              <a:rPr lang="en-US" sz="4400" dirty="0" smtClean="0"/>
+              <a:t>GUI</a:t>
+            </a:r>
+            <a:endParaRPr lang="en-US" sz="3200" dirty="0"/>
+          </a:p>
+        </p:txBody>
+      </p:sp>
+      <p:cxnSp>
+        <p:nvCxnSpPr>
+          <p:cNvPr id="17" name="Straight Arrow Connector 16"/>
+          <p:cNvCxnSpPr>
+            <a:stCxn id="6" idx="3"/>
+            <a:endCxn id="5" idx="0"/>
+          </p:cNvCxnSpPr>
+          <p:nvPr/>
+        </p:nvCxnSpPr>
+        <p:spPr>
+          <a:xfrm>
+            <a:off x="4340216" y="1977598"/>
+            <a:ext cx="1531484" cy="899150"/>
+          </a:xfrm>
+          <a:prstGeom prst="straightConnector1">
+            <a:avLst/>
+          </a:prstGeom>
+          <a:ln w="57150">
+            <a:solidFill>
+              <a:schemeClr val="tx1"/>
+            </a:solidFill>
+            <a:tailEnd type="triangle"/>
+          </a:ln>
+        </p:spPr>
+        <p:style>
+          <a:lnRef idx="1">
+            <a:schemeClr val="accent1"/>
+          </a:lnRef>
+          <a:fillRef idx="0">
+            <a:schemeClr val="accent1"/>
+          </a:fillRef>
+          <a:effectRef idx="0">
+            <a:schemeClr val="accent1"/>
+          </a:effectRef>
+          <a:fontRef idx="minor">
+            <a:schemeClr val="tx1"/>
+          </a:fontRef>
+        </p:style>
+      </p:cxnSp>
+      <p:cxnSp>
+        <p:nvCxnSpPr>
+          <p:cNvPr id="19" name="Straight Arrow Connector 18"/>
+          <p:cNvCxnSpPr>
+            <a:stCxn id="7" idx="1"/>
+            <a:endCxn id="5" idx="0"/>
+          </p:cNvCxnSpPr>
+          <p:nvPr/>
+        </p:nvCxnSpPr>
+        <p:spPr>
+          <a:xfrm flipH="1">
+            <a:off x="5871700" y="1876746"/>
+            <a:ext cx="1775417" cy="1000002"/>
+          </a:xfrm>
+          <a:prstGeom prst="straightConnector1">
+            <a:avLst/>
+          </a:prstGeom>
+          <a:ln w="57150">
+            <a:solidFill>
+              <a:schemeClr val="tx1"/>
+            </a:solidFill>
+            <a:tailEnd type="triangle"/>
+          </a:ln>
+        </p:spPr>
+        <p:style>
+          <a:lnRef idx="1">
+            <a:schemeClr val="accent1"/>
+          </a:lnRef>
+          <a:fillRef idx="0">
+            <a:schemeClr val="accent1"/>
+          </a:fillRef>
+          <a:effectRef idx="0">
+            <a:schemeClr val="accent1"/>
+          </a:effectRef>
+          <a:fontRef idx="minor">
+            <a:schemeClr val="tx1"/>
+          </a:fontRef>
+        </p:style>
+      </p:cxnSp>
+      <p:cxnSp>
+        <p:nvCxnSpPr>
+          <p:cNvPr id="21" name="Straight Arrow Connector 20"/>
+          <p:cNvCxnSpPr>
+            <a:stCxn id="7" idx="3"/>
+            <a:endCxn id="9" idx="0"/>
+          </p:cNvCxnSpPr>
+          <p:nvPr/>
+        </p:nvCxnSpPr>
+        <p:spPr>
+          <a:xfrm>
+            <a:off x="9658775" y="1876746"/>
+            <a:ext cx="761896" cy="986571"/>
+          </a:xfrm>
+          <a:prstGeom prst="straightConnector1">
+            <a:avLst/>
+          </a:prstGeom>
+          <a:ln w="57150">
+            <a:solidFill>
+              <a:schemeClr val="tx1"/>
+            </a:solidFill>
+            <a:tailEnd type="triangle"/>
+          </a:ln>
+        </p:spPr>
+        <p:style>
+          <a:lnRef idx="1">
+            <a:schemeClr val="accent1"/>
+          </a:lnRef>
+          <a:fillRef idx="0">
+            <a:schemeClr val="accent1"/>
+          </a:fillRef>
+          <a:effectRef idx="0">
+            <a:schemeClr val="accent1"/>
+          </a:effectRef>
+          <a:fontRef idx="minor">
+            <a:schemeClr val="tx1"/>
+          </a:fontRef>
+        </p:style>
+      </p:cxnSp>
+      <p:cxnSp>
+        <p:nvCxnSpPr>
+          <p:cNvPr id="24" name="Straight Arrow Connector 23"/>
+          <p:cNvCxnSpPr>
+            <a:stCxn id="8" idx="4"/>
+            <a:endCxn id="10" idx="2"/>
+          </p:cNvCxnSpPr>
+          <p:nvPr/>
+        </p:nvCxnSpPr>
+        <p:spPr>
+          <a:xfrm>
+            <a:off x="1021122" y="4046067"/>
+            <a:ext cx="473019" cy="1310627"/>
+          </a:xfrm>
+          <a:prstGeom prst="straightConnector1">
+            <a:avLst/>
+          </a:prstGeom>
+          <a:ln w="57150">
+            <a:solidFill>
+              <a:schemeClr val="tx1"/>
+            </a:solidFill>
+            <a:tailEnd type="triangle"/>
+          </a:ln>
+        </p:spPr>
+        <p:style>
+          <a:lnRef idx="1">
+            <a:schemeClr val="accent1"/>
+          </a:lnRef>
+          <a:fillRef idx="0">
+            <a:schemeClr val="accent1"/>
+          </a:fillRef>
+          <a:effectRef idx="0">
+            <a:schemeClr val="accent1"/>
+          </a:effectRef>
+          <a:fontRef idx="minor">
+            <a:schemeClr val="tx1"/>
+          </a:fontRef>
+        </p:style>
+      </p:cxnSp>
+      <p:cxnSp>
+        <p:nvCxnSpPr>
+          <p:cNvPr id="33" name="Straight Arrow Connector 32"/>
+          <p:cNvCxnSpPr>
+            <a:stCxn id="6" idx="1"/>
+            <a:endCxn id="8" idx="0"/>
+          </p:cNvCxnSpPr>
+          <p:nvPr/>
+        </p:nvCxnSpPr>
+        <p:spPr>
+          <a:xfrm flipH="1">
+            <a:off x="1021122" y="1977598"/>
+            <a:ext cx="1307436" cy="971201"/>
+          </a:xfrm>
+          <a:prstGeom prst="straightConnector1">
+            <a:avLst/>
+          </a:prstGeom>
+          <a:ln w="57150">
+            <a:solidFill>
+              <a:schemeClr val="tx1"/>
+            </a:solidFill>
+            <a:tailEnd type="triangle"/>
+          </a:ln>
+        </p:spPr>
+        <p:style>
+          <a:lnRef idx="1">
+            <a:schemeClr val="accent1"/>
+          </a:lnRef>
+          <a:fillRef idx="0">
+            <a:schemeClr val="accent1"/>
+          </a:fillRef>
+          <a:effectRef idx="0">
+            <a:schemeClr val="accent1"/>
+          </a:effectRef>
+          <a:fontRef idx="minor">
+            <a:schemeClr val="tx1"/>
+          </a:fontRef>
+        </p:style>
+      </p:cxnSp>
+      <p:cxnSp>
+        <p:nvCxnSpPr>
+          <p:cNvPr id="38" name="Straight Arrow Connector 37"/>
+          <p:cNvCxnSpPr>
+            <a:stCxn id="5" idx="2"/>
+            <a:endCxn id="8" idx="6"/>
+          </p:cNvCxnSpPr>
+          <p:nvPr/>
+        </p:nvCxnSpPr>
+        <p:spPr>
+          <a:xfrm flipH="1">
+            <a:off x="2026951" y="3425382"/>
+            <a:ext cx="2838920" cy="72051"/>
+          </a:xfrm>
+          <a:prstGeom prst="straightConnector1">
+            <a:avLst/>
+          </a:prstGeom>
+          <a:ln w="57150">
+            <a:solidFill>
+              <a:schemeClr val="tx1"/>
+            </a:solidFill>
+            <a:tailEnd type="triangle"/>
+          </a:ln>
+        </p:spPr>
+        <p:style>
+          <a:lnRef idx="1">
+            <a:schemeClr val="accent1"/>
+          </a:lnRef>
+          <a:fillRef idx="0">
+            <a:schemeClr val="accent1"/>
+          </a:fillRef>
+          <a:effectRef idx="0">
+            <a:schemeClr val="accent1"/>
+          </a:effectRef>
+          <a:fontRef idx="minor">
+            <a:schemeClr val="tx1"/>
+          </a:fontRef>
+        </p:style>
+      </p:cxnSp>
+      <p:cxnSp>
+        <p:nvCxnSpPr>
+          <p:cNvPr id="41" name="Straight Arrow Connector 40"/>
+          <p:cNvCxnSpPr>
+            <a:stCxn id="9" idx="2"/>
+            <a:endCxn id="5" idx="6"/>
+          </p:cNvCxnSpPr>
+          <p:nvPr/>
+        </p:nvCxnSpPr>
+        <p:spPr>
+          <a:xfrm flipH="1">
+            <a:off x="6877529" y="3411951"/>
+            <a:ext cx="2537313" cy="13431"/>
+          </a:xfrm>
+          <a:prstGeom prst="straightConnector1">
+            <a:avLst/>
+          </a:prstGeom>
+          <a:ln w="57150">
+            <a:solidFill>
+              <a:schemeClr val="tx1"/>
+            </a:solidFill>
+            <a:tailEnd type="triangle"/>
+          </a:ln>
+        </p:spPr>
+        <p:style>
+          <a:lnRef idx="1">
+            <a:schemeClr val="accent1"/>
+          </a:lnRef>
+          <a:fillRef idx="0">
+            <a:schemeClr val="accent1"/>
+          </a:fillRef>
+          <a:effectRef idx="0">
+            <a:schemeClr val="accent1"/>
+          </a:effectRef>
+          <a:fontRef idx="minor">
+            <a:schemeClr val="tx1"/>
+          </a:fontRef>
+        </p:style>
+      </p:cxnSp>
+      <p:cxnSp>
+        <p:nvCxnSpPr>
+          <p:cNvPr id="44" name="Straight Arrow Connector 43"/>
+          <p:cNvCxnSpPr>
+            <a:stCxn id="10" idx="6"/>
+            <a:endCxn id="11" idx="1"/>
+          </p:cNvCxnSpPr>
+          <p:nvPr/>
+        </p:nvCxnSpPr>
+        <p:spPr>
+          <a:xfrm flipV="1">
+            <a:off x="5090740" y="5356693"/>
+            <a:ext cx="827804" cy="1"/>
+          </a:xfrm>
+          <a:prstGeom prst="straightConnector1">
+            <a:avLst/>
+          </a:prstGeom>
+          <a:ln w="57150">
+            <a:solidFill>
+              <a:schemeClr val="tx1"/>
+            </a:solidFill>
+            <a:tailEnd type="triangle"/>
+          </a:ln>
+        </p:spPr>
+        <p:style>
+          <a:lnRef idx="1">
+            <a:schemeClr val="accent1"/>
+          </a:lnRef>
+          <a:fillRef idx="0">
+            <a:schemeClr val="accent1"/>
+          </a:fillRef>
+          <a:effectRef idx="0">
+            <a:schemeClr val="accent1"/>
+          </a:effectRef>
+          <a:fontRef idx="minor">
+            <a:schemeClr val="tx1"/>
+          </a:fontRef>
+        </p:style>
+      </p:cxnSp>
+      <p:cxnSp>
+        <p:nvCxnSpPr>
+          <p:cNvPr id="47" name="Straight Arrow Connector 46"/>
+          <p:cNvCxnSpPr>
+            <a:stCxn id="11" idx="3"/>
+            <a:endCxn id="12" idx="1"/>
+          </p:cNvCxnSpPr>
+          <p:nvPr/>
+        </p:nvCxnSpPr>
+        <p:spPr>
+          <a:xfrm>
+            <a:off x="8295958" y="5356693"/>
+            <a:ext cx="1118884" cy="0"/>
+          </a:xfrm>
+          <a:prstGeom prst="straightConnector1">
+            <a:avLst/>
+          </a:prstGeom>
+          <a:ln w="57150">
+            <a:solidFill>
+              <a:schemeClr val="tx1"/>
+            </a:solidFill>
+            <a:tailEnd type="triangle"/>
+          </a:ln>
+        </p:spPr>
+        <p:style>
+          <a:lnRef idx="1">
+            <a:schemeClr val="accent1"/>
+          </a:lnRef>
+          <a:fillRef idx="0">
+            <a:schemeClr val="accent1"/>
+          </a:fillRef>
+          <a:effectRef idx="0">
+            <a:schemeClr val="accent1"/>
+          </a:effectRef>
+          <a:fontRef idx="minor">
+            <a:schemeClr val="tx1"/>
+          </a:fontRef>
+        </p:style>
+      </p:cxnSp>
+    </p:spTree>
+    <p:extLst>
+      <p:ext uri="{BB962C8B-B14F-4D97-AF65-F5344CB8AC3E}">
+        <p14:creationId xmlns:p14="http://schemas.microsoft.com/office/powerpoint/2010/main" val="2157164541"/>
+      </p:ext>
+    </p:extLst>
+  </p:cSld>
+  <p:clrMapOvr>
+    <a:masterClrMapping/>
+  </p:clrMapOvr>
+  <p:timing>
+    <p:tnLst>
+      <p:par>
+        <p:cTn id="1" dur="indefinite" restart="never" nodeType="tmRoot"/>
+      </p:par>
+    </p:tnLst>
+  </p:timing>
+</p:sld>
+</file>
+
+<file path=ppt/slides/slide6.xml><?xml version="1.0" encoding="utf-8"?>
+<p:sld xmlns:a="http://schemas.openxmlformats.org/drawingml/2006/main" xmlns:r="http://schemas.openxmlformats.org/officeDocument/2006/relationships" xmlns:p="http://schemas.openxmlformats.org/presentationml/2006/main">
+  <p:cSld>
+    <p:spTree>
+      <p:nvGrpSpPr>
+        <p:cNvPr id="1" name=""/>
+        <p:cNvGrpSpPr/>
+        <p:nvPr/>
+      </p:nvGrpSpPr>
+      <p:grpSpPr>
+        <a:xfrm>
+          <a:off x="0" y="0"/>
+          <a:ext cx="0" cy="0"/>
+          <a:chOff x="0" y="0"/>
+          <a:chExt cx="0" cy="0"/>
+        </a:xfrm>
+      </p:grpSpPr>
+      <p:sp>
+        <p:nvSpPr>
+          <p:cNvPr id="2" name="Title 1"/>
+          <p:cNvSpPr>
+            <a:spLocks noGrp="1"/>
+          </p:cNvSpPr>
+          <p:nvPr>
+            <p:ph type="title"/>
+          </p:nvPr>
+        </p:nvSpPr>
+        <p:spPr>
+          <a:xfrm>
+            <a:off x="335343" y="228635"/>
+            <a:ext cx="10515600" cy="1325563"/>
+          </a:xfrm>
+        </p:spPr>
+        <p:txBody>
+          <a:bodyPr>
+            <a:normAutofit/>
+          </a:bodyPr>
+          <a:lstStyle/>
+          <a:p>
+            <a:pPr lvl="0">
+              <a:lnSpc>
+                <a:spcPct val="100000"/>
+              </a:lnSpc>
+              <a:spcBef>
+                <a:spcPts val="0"/>
+              </a:spcBef>
+            </a:pPr>
+            <a:r>
+              <a:rPr lang="en-US" sz="7200" dirty="0" smtClean="0">
+                <a:solidFill>
+                  <a:prstClr val="black"/>
+                </a:solidFill>
+                <a:latin typeface="Roboto Medium" panose="02000000000000000000" pitchFamily="2" charset="0"/>
+                <a:cs typeface="+mn-cs"/>
+              </a:rPr>
+              <a:t>Larger Impacts</a:t>
+            </a:r>
+            <a:endParaRPr lang="en-US" dirty="0"/>
+          </a:p>
+        </p:txBody>
+      </p:sp>
+      <p:sp>
+        <p:nvSpPr>
+          <p:cNvPr id="3" name="Content Placeholder 2"/>
+          <p:cNvSpPr>
+            <a:spLocks noGrp="1"/>
+          </p:cNvSpPr>
+          <p:nvPr>
+            <p:ph idx="1"/>
+          </p:nvPr>
+        </p:nvSpPr>
+        <p:spPr>
+          <a:xfrm>
+            <a:off x="3901464" y="1577816"/>
+            <a:ext cx="7338869" cy="1877692"/>
+          </a:xfrm>
+        </p:spPr>
+        <p:txBody>
+          <a:bodyPr>
+            <a:normAutofit/>
+          </a:bodyPr>
+          <a:lstStyle/>
+          <a:p>
+            <a:pPr marL="0" indent="0">
+              <a:buNone/>
+            </a:pPr>
+            <a:endParaRPr lang="en-US" sz="3000" dirty="0" smtClean="0">
+              <a:latin typeface="Roboto Medium" panose="02000000000000000000"/>
+            </a:endParaRPr>
+          </a:p>
+          <a:p>
+            <a:pPr marL="0" indent="0" algn="ctr">
+              <a:buNone/>
+            </a:pPr>
+            <a:r>
+              <a:rPr lang="en-US" sz="3200" dirty="0" smtClean="0">
+                <a:latin typeface="Roboto Medium" panose="02000000000000000000"/>
+              </a:rPr>
+              <a:t>Communication between self-driving and human operated cars</a:t>
+            </a:r>
+          </a:p>
+          <a:p>
+            <a:pPr marL="0" indent="0">
+              <a:buNone/>
+            </a:pPr>
+            <a:endParaRPr lang="en-US" sz="3000" dirty="0">
+              <a:latin typeface="Roboto Medium" panose="02000000000000000000"/>
+            </a:endParaRPr>
+          </a:p>
+          <a:p>
+            <a:pPr marL="0" indent="0">
+              <a:buNone/>
+            </a:pPr>
+            <a:endParaRPr lang="en-US" sz="3000" dirty="0" smtClean="0">
+              <a:latin typeface="Roboto Medium" panose="02000000000000000000"/>
+            </a:endParaRPr>
+          </a:p>
+        </p:txBody>
+      </p:sp>
+      <p:cxnSp>
+        <p:nvCxnSpPr>
+          <p:cNvPr id="4" name="Straight Connector 3"/>
+          <p:cNvCxnSpPr/>
+          <p:nvPr/>
+        </p:nvCxnSpPr>
+        <p:spPr>
+          <a:xfrm flipV="1">
+            <a:off x="4038651" y="3363256"/>
+            <a:ext cx="7201682" cy="809"/>
+          </a:xfrm>
+          <a:prstGeom prst="line">
+            <a:avLst/>
+          </a:prstGeom>
+          <a:ln w="28575">
+            <a:solidFill>
+              <a:srgbClr val="FF0000"/>
+            </a:solidFill>
+          </a:ln>
+        </p:spPr>
+        <p:style>
+          <a:lnRef idx="1">
+            <a:schemeClr val="dk1"/>
+          </a:lnRef>
+          <a:fillRef idx="0">
+            <a:schemeClr val="dk1"/>
+          </a:fillRef>
+          <a:effectRef idx="0">
+            <a:schemeClr val="dk1"/>
+          </a:effectRef>
+          <a:fontRef idx="minor">
+            <a:schemeClr val="tx1"/>
+          </a:fontRef>
+        </p:style>
+      </p:cxnSp>
+      <p:sp>
+        <p:nvSpPr>
+          <p:cNvPr id="7" name="TextBox 6"/>
+          <p:cNvSpPr txBox="1"/>
+          <p:nvPr/>
+        </p:nvSpPr>
+        <p:spPr>
+          <a:xfrm>
+            <a:off x="4632976" y="3673610"/>
+            <a:ext cx="5624425" cy="1015663"/>
+          </a:xfrm>
+          <a:prstGeom prst="rect">
+            <a:avLst/>
+          </a:prstGeom>
+          <a:noFill/>
+        </p:spPr>
+        <p:txBody>
+          <a:bodyPr wrap="none" rtlCol="0">
+            <a:spAutoFit/>
+          </a:bodyPr>
+          <a:lstStyle/>
+          <a:p>
+            <a:r>
+              <a:rPr lang="en-US" sz="3000" dirty="0" smtClean="0">
+                <a:latin typeface="Roboto Medium" panose="02000000000000000000"/>
+              </a:rPr>
+              <a:t>Increases user </a:t>
+            </a:r>
+            <a:r>
+              <a:rPr lang="en-US" sz="3000" b="1" dirty="0" smtClean="0">
+                <a:latin typeface="Roboto Medium" panose="02000000000000000000"/>
+              </a:rPr>
+              <a:t>privacy</a:t>
+            </a:r>
+            <a:r>
+              <a:rPr lang="en-US" sz="3000" dirty="0" smtClean="0">
+                <a:latin typeface="Roboto Medium" panose="02000000000000000000"/>
+              </a:rPr>
+              <a:t> and data </a:t>
+            </a:r>
+            <a:r>
+              <a:rPr lang="en-US" sz="3000" b="1" dirty="0" smtClean="0">
+                <a:latin typeface="Roboto Medium" panose="02000000000000000000"/>
+              </a:rPr>
+              <a:t>security</a:t>
+            </a:r>
+          </a:p>
+          <a:p>
+            <a:endParaRPr lang="en-US" sz="3000" dirty="0"/>
+          </a:p>
+        </p:txBody>
+      </p:sp>
+      <p:sp>
+        <p:nvSpPr>
+          <p:cNvPr id="10" name="TextBox 9"/>
+          <p:cNvSpPr txBox="1"/>
+          <p:nvPr/>
+        </p:nvSpPr>
+        <p:spPr>
+          <a:xfrm>
+            <a:off x="4497265" y="5074902"/>
+            <a:ext cx="5895845" cy="1015663"/>
+          </a:xfrm>
+          <a:prstGeom prst="rect">
+            <a:avLst/>
+          </a:prstGeom>
+          <a:noFill/>
+        </p:spPr>
+        <p:txBody>
+          <a:bodyPr wrap="none" rtlCol="0">
+            <a:spAutoFit/>
+          </a:bodyPr>
+          <a:lstStyle/>
+          <a:p>
+            <a:r>
+              <a:rPr lang="en-US" sz="3000" dirty="0" smtClean="0">
+                <a:latin typeface="Roboto Medium" panose="02000000000000000000"/>
+              </a:rPr>
+              <a:t>Reduces reliance on GPS enabled phones</a:t>
+            </a:r>
+            <a:endParaRPr lang="en-US" sz="3000" b="1" dirty="0" smtClean="0">
+              <a:latin typeface="Roboto Medium" panose="02000000000000000000"/>
+            </a:endParaRPr>
+          </a:p>
+          <a:p>
+            <a:endParaRPr lang="en-US" sz="3000" dirty="0"/>
+          </a:p>
+        </p:txBody>
+      </p:sp>
+      <p:cxnSp>
+        <p:nvCxnSpPr>
+          <p:cNvPr id="11" name="Straight Connector 10"/>
+          <p:cNvCxnSpPr/>
+          <p:nvPr/>
+        </p:nvCxnSpPr>
+        <p:spPr>
+          <a:xfrm>
+            <a:off x="4038651" y="4644362"/>
+            <a:ext cx="7201682" cy="44911"/>
+          </a:xfrm>
+          <a:prstGeom prst="line">
+            <a:avLst/>
+          </a:prstGeom>
+          <a:ln w="28575">
+            <a:solidFill>
+              <a:srgbClr val="FF0000"/>
+            </a:solidFill>
+          </a:ln>
+        </p:spPr>
+        <p:style>
+          <a:lnRef idx="1">
+            <a:schemeClr val="dk1"/>
+          </a:lnRef>
+          <a:fillRef idx="0">
+            <a:schemeClr val="dk1"/>
+          </a:fillRef>
+          <a:effectRef idx="0">
+            <a:schemeClr val="dk1"/>
+          </a:effectRef>
+          <a:fontRef idx="minor">
+            <a:schemeClr val="tx1"/>
+          </a:fontRef>
+        </p:style>
+      </p:cxnSp>
+      <p:pic>
+        <p:nvPicPr>
+          <p:cNvPr id="1028" name="Picture 4" descr="Image result for earth line drawing"/>
+          <p:cNvPicPr>
+            <a:picLocks noChangeAspect="1" noChangeArrowheads="1"/>
+          </p:cNvPicPr>
+          <p:nvPr/>
+        </p:nvPicPr>
+        <p:blipFill>
+          <a:blip r:embed="rId3">
+            <a:extLst>
+              <a:ext uri="{28A0092B-C50C-407E-A947-70E740481C1C}">
+                <a14:useLocalDpi xmlns:a14="http://schemas.microsoft.com/office/drawing/2010/main" val="0"/>
+              </a:ext>
+            </a:extLst>
+          </a:blip>
+          <a:srcRect/>
+          <a:stretch>
+            <a:fillRect/>
+          </a:stretch>
+        </p:blipFill>
+        <p:spPr bwMode="auto">
+          <a:xfrm>
+            <a:off x="609660" y="2514610"/>
+            <a:ext cx="2834609" cy="2834609"/>
+          </a:xfrm>
+          <a:prstGeom prst="rect">
+            <a:avLst/>
+          </a:prstGeom>
+          <a:noFill/>
+          <a:extLst>
+            <a:ext uri="{909E8E84-426E-40DD-AFC4-6F175D3DCCD1}">
+              <a14:hiddenFill xmlns:a14="http://schemas.microsoft.com/office/drawing/2010/main">
+                <a:solidFill>
+                  <a:srgbClr val="FFFFFF"/>
+                </a:solidFill>
+              </a14:hiddenFill>
+            </a:ext>
+          </a:extLst>
+        </p:spPr>
+      </p:pic>
+    </p:spTree>
+    <p:extLst>
+      <p:ext uri="{BB962C8B-B14F-4D97-AF65-F5344CB8AC3E}">
+        <p14:creationId xmlns:p14="http://schemas.microsoft.com/office/powerpoint/2010/main" val="3854399153"/>
+      </p:ext>
+    </p:extLst>
+  </p:cSld>
+  <p:clrMapOvr>
+    <a:masterClrMapping/>
+  </p:clrMapOvr>
+  <p:timing>
+    <p:tnLst>
+      <p:par>
+        <p:cTn id="1" dur="indefinite" restart="never" nodeType="tmRoot"/>
+      </p:par>
+    </p:tnLst>
+  </p:timing>
+</p:sld>
+</file>
+
+<file path=ppt/slides/slide7.xml><?xml version="1.0" encoding="utf-8"?>
+<p:sld xmlns:a="http://schemas.openxmlformats.org/drawingml/2006/main" xmlns:r="http://schemas.openxmlformats.org/officeDocument/2006/relationships" xmlns:p="http://schemas.openxmlformats.org/presentationml/2006/main">
+  <p:cSld>
+    <p:spTree>
+      <p:nvGrpSpPr>
+        <p:cNvPr id="1" name=""/>
+        <p:cNvGrpSpPr/>
+        <p:nvPr/>
+      </p:nvGrpSpPr>
+      <p:grpSpPr>
+        <a:xfrm>
+          <a:off x="0" y="0"/>
+          <a:ext cx="0" cy="0"/>
+          <a:chOff x="0" y="0"/>
+          <a:chExt cx="0" cy="0"/>
+        </a:xfrm>
+      </p:grpSpPr>
+      <p:pic>
+        <p:nvPicPr>
+          <p:cNvPr id="2080" name="Picture 32" descr="Image result for google cloud sql logo"/>
+          <p:cNvPicPr>
+            <a:picLocks noChangeAspect="1" noChangeArrowheads="1"/>
+          </p:cNvPicPr>
+          <p:nvPr/>
+        </p:nvPicPr>
+        <p:blipFill>
+          <a:blip r:embed="rId2">
+            <a:extLst>
+              <a:ext uri="{28A0092B-C50C-407E-A947-70E740481C1C}">
+                <a14:useLocalDpi xmlns:a14="http://schemas.microsoft.com/office/drawing/2010/main" val="0"/>
+              </a:ext>
+            </a:extLst>
+          </a:blip>
+          <a:srcRect/>
+          <a:stretch>
+            <a:fillRect/>
+          </a:stretch>
+        </p:blipFill>
+        <p:spPr bwMode="auto">
+          <a:xfrm>
+            <a:off x="7861969" y="3604623"/>
+            <a:ext cx="4484441" cy="2787254"/>
+          </a:xfrm>
+          <a:prstGeom prst="rect">
+            <a:avLst/>
+          </a:prstGeom>
+          <a:noFill/>
+          <a:extLst>
+            <a:ext uri="{909E8E84-426E-40DD-AFC4-6F175D3DCCD1}">
+              <a14:hiddenFill xmlns:a14="http://schemas.microsoft.com/office/drawing/2010/main">
+                <a:solidFill>
+                  <a:srgbClr val="FFFFFF"/>
+                </a:solidFill>
+              </a14:hiddenFill>
+            </a:ext>
+          </a:extLst>
+        </p:spPr>
+      </p:pic>
+      <p:sp>
+        <p:nvSpPr>
+          <p:cNvPr id="6" name="TextBox 5"/>
+          <p:cNvSpPr txBox="1"/>
+          <p:nvPr/>
+        </p:nvSpPr>
+        <p:spPr>
+          <a:xfrm>
+            <a:off x="335343" y="228635"/>
+            <a:ext cx="5799280" cy="1200329"/>
+          </a:xfrm>
+          <a:prstGeom prst="rect">
+            <a:avLst/>
+          </a:prstGeom>
+          <a:noFill/>
+        </p:spPr>
+        <p:txBody>
+          <a:bodyPr wrap="none" rtlCol="0">
+            <a:spAutoFit/>
+          </a:bodyPr>
+          <a:lstStyle/>
+          <a:p>
+            <a:r>
+              <a:rPr lang="en-US" sz="7200" dirty="0" smtClean="0">
+                <a:latin typeface="Roboto Medium" panose="02000000000000000000" pitchFamily="2" charset="0"/>
+                <a:ea typeface="Roboto Medium" panose="02000000000000000000" pitchFamily="2" charset="0"/>
+              </a:rPr>
+              <a:t>Technology Used</a:t>
+            </a:r>
+          </a:p>
+        </p:txBody>
+      </p:sp>
+      <p:pic>
+        <p:nvPicPr>
+          <p:cNvPr id="2050" name="Picture 2" descr="Image result for arduino logo"/>
+          <p:cNvPicPr>
+            <a:picLocks noChangeAspect="1" noChangeArrowheads="1"/>
+          </p:cNvPicPr>
+          <p:nvPr/>
+        </p:nvPicPr>
+        <p:blipFill>
+          <a:blip r:embed="rId3" cstate="print">
+            <a:extLst>
+              <a:ext uri="{28A0092B-C50C-407E-A947-70E740481C1C}">
+                <a14:useLocalDpi xmlns:a14="http://schemas.microsoft.com/office/drawing/2010/main" val="0"/>
+              </a:ext>
+            </a:extLst>
+          </a:blip>
+          <a:srcRect/>
+          <a:stretch>
+            <a:fillRect/>
+          </a:stretch>
+        </p:blipFill>
+        <p:spPr bwMode="auto">
+          <a:xfrm>
+            <a:off x="5234635" y="1500799"/>
+            <a:ext cx="2077596" cy="1413920"/>
+          </a:xfrm>
+          <a:prstGeom prst="rect">
+            <a:avLst/>
+          </a:prstGeom>
+          <a:noFill/>
+          <a:extLst>
+            <a:ext uri="{909E8E84-426E-40DD-AFC4-6F175D3DCCD1}">
+              <a14:hiddenFill xmlns:a14="http://schemas.microsoft.com/office/drawing/2010/main">
+                <a:solidFill>
+                  <a:srgbClr val="FFFFFF"/>
+                </a:solidFill>
+              </a14:hiddenFill>
+            </a:ext>
+          </a:extLst>
+        </p:spPr>
+      </p:pic>
+      <p:pic>
+        <p:nvPicPr>
+          <p:cNvPr id="2062" name="Picture 14" descr="Related image"/>
+          <p:cNvPicPr>
+            <a:picLocks noChangeAspect="1" noChangeArrowheads="1"/>
+          </p:cNvPicPr>
+          <p:nvPr/>
+        </p:nvPicPr>
+        <p:blipFill>
+          <a:blip r:embed="rId4">
+            <a:extLst>
+              <a:ext uri="{28A0092B-C50C-407E-A947-70E740481C1C}">
+                <a14:useLocalDpi xmlns:a14="http://schemas.microsoft.com/office/drawing/2010/main" val="0"/>
+              </a:ext>
+            </a:extLst>
+          </a:blip>
+          <a:srcRect/>
+          <a:stretch>
+            <a:fillRect/>
+          </a:stretch>
+        </p:blipFill>
+        <p:spPr bwMode="auto">
+          <a:xfrm>
+            <a:off x="5084726" y="2716143"/>
+            <a:ext cx="2377414" cy="2229487"/>
+          </a:xfrm>
+          <a:prstGeom prst="rect">
+            <a:avLst/>
+          </a:prstGeom>
+          <a:noFill/>
+          <a:extLst>
+            <a:ext uri="{909E8E84-426E-40DD-AFC4-6F175D3DCCD1}">
+              <a14:hiddenFill xmlns:a14="http://schemas.microsoft.com/office/drawing/2010/main">
+                <a:solidFill>
+                  <a:srgbClr val="FFFFFF"/>
+                </a:solidFill>
+              </a14:hiddenFill>
+            </a:ext>
+          </a:extLst>
+        </p:spPr>
+      </p:pic>
+      <p:pic>
+        <p:nvPicPr>
+          <p:cNvPr id="2066" name="Picture 18" descr="logo.png"/>
+          <p:cNvPicPr>
+            <a:picLocks noChangeAspect="1" noChangeArrowheads="1"/>
+          </p:cNvPicPr>
+          <p:nvPr/>
+        </p:nvPicPr>
+        <p:blipFill>
+          <a:blip r:embed="rId5" cstate="print">
+            <a:extLst>
+              <a:ext uri="{28A0092B-C50C-407E-A947-70E740481C1C}">
+                <a14:useLocalDpi xmlns:a14="http://schemas.microsoft.com/office/drawing/2010/main" val="0"/>
+              </a:ext>
+            </a:extLst>
+          </a:blip>
+          <a:srcRect/>
+          <a:stretch>
+            <a:fillRect/>
+          </a:stretch>
+        </p:blipFill>
+        <p:spPr bwMode="auto">
+          <a:xfrm>
+            <a:off x="121122" y="4930430"/>
+            <a:ext cx="4471904" cy="1222535"/>
+          </a:xfrm>
+          <a:prstGeom prst="rect">
+            <a:avLst/>
+          </a:prstGeom>
+          <a:noFill/>
+          <a:extLst>
+            <a:ext uri="{909E8E84-426E-40DD-AFC4-6F175D3DCCD1}">
+              <a14:hiddenFill xmlns:a14="http://schemas.microsoft.com/office/drawing/2010/main">
+                <a:solidFill>
+                  <a:srgbClr val="FFFFFF"/>
+                </a:solidFill>
+              </a14:hiddenFill>
+            </a:ext>
+          </a:extLst>
+        </p:spPr>
+      </p:pic>
+      <p:pic>
+        <p:nvPicPr>
+          <p:cNvPr id="2068" name="Picture 20" descr="Image result for python logo"/>
+          <p:cNvPicPr>
+            <a:picLocks noChangeAspect="1" noChangeArrowheads="1"/>
+          </p:cNvPicPr>
+          <p:nvPr/>
+        </p:nvPicPr>
+        <p:blipFill>
+          <a:blip r:embed="rId6" cstate="print">
+            <a:extLst>
+              <a:ext uri="{28A0092B-C50C-407E-A947-70E740481C1C}">
+                <a14:useLocalDpi xmlns:a14="http://schemas.microsoft.com/office/drawing/2010/main" val="0"/>
+              </a:ext>
+            </a:extLst>
+          </a:blip>
+          <a:srcRect/>
+          <a:stretch>
+            <a:fillRect/>
+          </a:stretch>
+        </p:blipFill>
+        <p:spPr bwMode="auto">
+          <a:xfrm>
+            <a:off x="1749597" y="3451420"/>
+            <a:ext cx="1470119" cy="1470119"/>
+          </a:xfrm>
+          <a:prstGeom prst="rect">
+            <a:avLst/>
+          </a:prstGeom>
+          <a:noFill/>
+          <a:extLst>
+            <a:ext uri="{909E8E84-426E-40DD-AFC4-6F175D3DCCD1}">
+              <a14:hiddenFill xmlns:a14="http://schemas.microsoft.com/office/drawing/2010/main">
+                <a:solidFill>
+                  <a:srgbClr val="FFFFFF"/>
+                </a:solidFill>
+              </a14:hiddenFill>
+            </a:ext>
+          </a:extLst>
+        </p:spPr>
+      </p:pic>
+      <p:pic>
+        <p:nvPicPr>
+          <p:cNvPr id="2076" name="Picture 28" descr="Front-end - Html Css Javascript Logo Clipart (800x450), Png Download"/>
+          <p:cNvPicPr>
+            <a:picLocks noChangeAspect="1" noChangeArrowheads="1"/>
+          </p:cNvPicPr>
+          <p:nvPr/>
+        </p:nvPicPr>
+        <p:blipFill>
+          <a:blip r:embed="rId7" cstate="print">
+            <a:extLst>
+              <a:ext uri="{28A0092B-C50C-407E-A947-70E740481C1C}">
+                <a14:useLocalDpi xmlns:a14="http://schemas.microsoft.com/office/drawing/2010/main" val="0"/>
+              </a:ext>
+            </a:extLst>
+          </a:blip>
+          <a:srcRect/>
+          <a:stretch>
+            <a:fillRect/>
+          </a:stretch>
+        </p:blipFill>
+        <p:spPr bwMode="auto">
+          <a:xfrm>
+            <a:off x="621288" y="1500799"/>
+            <a:ext cx="3471572" cy="1950621"/>
+          </a:xfrm>
+          <a:prstGeom prst="rect">
+            <a:avLst/>
+          </a:prstGeom>
+          <a:noFill/>
+          <a:extLst>
+            <a:ext uri="{909E8E84-426E-40DD-AFC4-6F175D3DCCD1}">
+              <a14:hiddenFill xmlns:a14="http://schemas.microsoft.com/office/drawing/2010/main">
+                <a:solidFill>
+                  <a:srgbClr val="FFFFFF"/>
+                </a:solidFill>
+              </a14:hiddenFill>
+            </a:ext>
+          </a:extLst>
+        </p:spPr>
+      </p:pic>
+      <p:pic>
+        <p:nvPicPr>
+          <p:cNvPr id="2078" name="Picture 30" descr="Image result for c++ logo"/>
+          <p:cNvPicPr>
+            <a:picLocks noChangeAspect="1" noChangeArrowheads="1"/>
+          </p:cNvPicPr>
+          <p:nvPr/>
+        </p:nvPicPr>
+        <p:blipFill>
+          <a:blip r:embed="rId8" cstate="print">
+            <a:extLst>
+              <a:ext uri="{28A0092B-C50C-407E-A947-70E740481C1C}">
+                <a14:useLocalDpi xmlns:a14="http://schemas.microsoft.com/office/drawing/2010/main" val="0"/>
+              </a:ext>
+            </a:extLst>
+          </a:blip>
+          <a:srcRect/>
+          <a:stretch>
+            <a:fillRect/>
+          </a:stretch>
+        </p:blipFill>
+        <p:spPr bwMode="auto">
+          <a:xfrm>
+            <a:off x="7861969" y="2087197"/>
+            <a:ext cx="1118955" cy="1257892"/>
+          </a:xfrm>
+          <a:prstGeom prst="rect">
+            <a:avLst/>
+          </a:prstGeom>
+          <a:noFill/>
+          <a:extLst>
+            <a:ext uri="{909E8E84-426E-40DD-AFC4-6F175D3DCCD1}">
+              <a14:hiddenFill xmlns:a14="http://schemas.microsoft.com/office/drawing/2010/main">
+                <a:solidFill>
+                  <a:srgbClr val="FFFFFF"/>
+                </a:solidFill>
+              </a14:hiddenFill>
+            </a:ext>
+          </a:extLst>
+        </p:spPr>
+      </p:pic>
+      <p:pic>
+        <p:nvPicPr>
+          <p:cNvPr id="2082" name="Picture 34" descr="Image result for aws"/>
+          <p:cNvPicPr>
+            <a:picLocks noChangeAspect="1" noChangeArrowheads="1"/>
+          </p:cNvPicPr>
+          <p:nvPr/>
+        </p:nvPicPr>
+        <p:blipFill>
+          <a:blip r:embed="rId9" cstate="print">
+            <a:extLst>
+              <a:ext uri="{28A0092B-C50C-407E-A947-70E740481C1C}">
+                <a14:useLocalDpi xmlns:a14="http://schemas.microsoft.com/office/drawing/2010/main" val="0"/>
+              </a:ext>
+            </a:extLst>
+          </a:blip>
+          <a:srcRect/>
+          <a:stretch>
+            <a:fillRect/>
+          </a:stretch>
+        </p:blipFill>
+        <p:spPr bwMode="auto">
+          <a:xfrm>
+            <a:off x="9652354" y="1707628"/>
+            <a:ext cx="1991984" cy="1191870"/>
+          </a:xfrm>
+          <a:prstGeom prst="rect">
+            <a:avLst/>
+          </a:prstGeom>
+          <a:noFill/>
+          <a:extLst>
+            <a:ext uri="{909E8E84-426E-40DD-AFC4-6F175D3DCCD1}">
+              <a14:hiddenFill xmlns:a14="http://schemas.microsoft.com/office/drawing/2010/main">
+                <a:solidFill>
+                  <a:srgbClr val="FFFFFF"/>
+                </a:solidFill>
+              </a14:hiddenFill>
+            </a:ext>
+          </a:extLst>
+        </p:spPr>
+      </p:pic>
+      <p:pic>
+        <p:nvPicPr>
+          <p:cNvPr id="2084" name="Picture 36" descr="Image result for dannon logo"/>
+          <p:cNvPicPr>
+            <a:picLocks noChangeAspect="1" noChangeArrowheads="1"/>
+          </p:cNvPicPr>
+          <p:nvPr/>
+        </p:nvPicPr>
+        <p:blipFill rotWithShape="1">
+          <a:blip r:embed="rId10" cstate="print">
+            <a:extLst>
+              <a:ext uri="{28A0092B-C50C-407E-A947-70E740481C1C}">
+                <a14:useLocalDpi xmlns:a14="http://schemas.microsoft.com/office/drawing/2010/main" val="0"/>
+              </a:ext>
+            </a:extLst>
+          </a:blip>
+          <a:srcRect t="23437" b="23125"/>
+          <a:stretch/>
+        </p:blipFill>
+        <p:spPr bwMode="auto">
+          <a:xfrm>
+            <a:off x="4768481" y="4646694"/>
+            <a:ext cx="3174561" cy="1696387"/>
+          </a:xfrm>
+          <a:prstGeom prst="rect">
+            <a:avLst/>
+          </a:prstGeom>
+          <a:noFill/>
+          <a:extLst>
+            <a:ext uri="{909E8E84-426E-40DD-AFC4-6F175D3DCCD1}">
+              <a14:hiddenFill xmlns:a14="http://schemas.microsoft.com/office/drawing/2010/main">
+                <a:solidFill>
+                  <a:srgbClr val="FFFFFF"/>
+                </a:solidFill>
+              </a14:hiddenFill>
+            </a:ext>
+          </a:extLst>
+        </p:spPr>
+      </p:pic>
+    </p:spTree>
+    <p:extLst>
+      <p:ext uri="{BB962C8B-B14F-4D97-AF65-F5344CB8AC3E}">
+        <p14:creationId xmlns:p14="http://schemas.microsoft.com/office/powerpoint/2010/main" val="2829338739"/>
+      </p:ext>
+    </p:extLst>
+  </p:cSld>
+  <p:clrMapOvr>
+    <a:masterClrMapping/>
+  </p:clrMapOvr>
+  <p:timing>
+    <p:tnLst>
+      <p:par>
+        <p:cTn id="1" dur="indefinite" restart="never" nodeType="tmRoot"/>
+      </p:par>
+    </p:tnLst>
+  </p:timing>
+</p:sld>
+</file>
+
+<file path=ppt/slides/slide8.xml><?xml version="1.0" encoding="utf-8"?>
+<p:sld xmlns:a="http://schemas.openxmlformats.org/drawingml/2006/main" xmlns:r="http://schemas.openxmlformats.org/officeDocument/2006/relationships" xmlns:p="http://schemas.openxmlformats.org/presentationml/2006/main">
+  <p:cSld>
+    <p:spTree>
+      <p:nvGrpSpPr>
+        <p:cNvPr id="1" name=""/>
+        <p:cNvGrpSpPr/>
+        <p:nvPr/>
+      </p:nvGrpSpPr>
+      <p:grpSpPr>
+        <a:xfrm>
+          <a:off x="0" y="0"/>
+          <a:ext cx="0" cy="0"/>
+          <a:chOff x="0" y="0"/>
+          <a:chExt cx="0" cy="0"/>
+        </a:xfrm>
+      </p:grpSpPr>
+      <p:pic>
+        <p:nvPicPr>
+          <p:cNvPr id="3" name="Picture 2"/>
+          <p:cNvPicPr>
+            <a:picLocks noChangeAspect="1"/>
+          </p:cNvPicPr>
+          <p:nvPr/>
+        </p:nvPicPr>
+        <p:blipFill>
+          <a:blip r:embed="rId2" cstate="print">
+            <a:extLst>
+              <a:ext uri="{28A0092B-C50C-407E-A947-70E740481C1C}">
+                <a14:useLocalDpi xmlns:a14="http://schemas.microsoft.com/office/drawing/2010/main" val="0"/>
+              </a:ext>
+            </a:extLst>
+          </a:blip>
+          <a:stretch>
+            <a:fillRect/>
+          </a:stretch>
+        </p:blipFill>
+        <p:spPr>
+          <a:xfrm>
+            <a:off x="8839170" y="6172170"/>
+            <a:ext cx="2987074" cy="519904"/>
+          </a:xfrm>
+          <a:prstGeom prst="rect">
+            <a:avLst/>
+          </a:prstGeom>
+        </p:spPr>
+      </p:pic>
+      <p:sp>
+        <p:nvSpPr>
+          <p:cNvPr id="8" name="TextBox 7"/>
+          <p:cNvSpPr txBox="1"/>
+          <p:nvPr/>
+        </p:nvSpPr>
+        <p:spPr>
+          <a:xfrm>
+            <a:off x="335343" y="228635"/>
+            <a:ext cx="4094839" cy="1200329"/>
+          </a:xfrm>
+          <a:prstGeom prst="rect">
+            <a:avLst/>
+          </a:prstGeom>
+          <a:noFill/>
+        </p:spPr>
+        <p:txBody>
+          <a:bodyPr wrap="none" rtlCol="0">
+            <a:spAutoFit/>
+          </a:bodyPr>
+          <a:lstStyle/>
+          <a:p>
+            <a:r>
+              <a:rPr lang="en-US" sz="7200" dirty="0" smtClean="0">
+                <a:latin typeface="Roboto Medium" panose="02000000000000000000" pitchFamily="2" charset="0"/>
+                <a:ea typeface="Roboto Medium" panose="02000000000000000000" pitchFamily="2" charset="0"/>
+              </a:rPr>
+              <a:t>Future Work</a:t>
+            </a:r>
+            <a:endParaRPr lang="en-US" sz="7200" dirty="0">
+              <a:latin typeface="Roboto Medium" panose="02000000000000000000" pitchFamily="2" charset="0"/>
+              <a:ea typeface="Roboto Medium" panose="02000000000000000000" pitchFamily="2" charset="0"/>
+            </a:endParaRPr>
+          </a:p>
+        </p:txBody>
+      </p:sp>
+      <p:sp>
+        <p:nvSpPr>
+          <p:cNvPr id="4" name="TextBox 3"/>
+          <p:cNvSpPr txBox="1"/>
+          <p:nvPr/>
+        </p:nvSpPr>
+        <p:spPr>
+          <a:xfrm>
+            <a:off x="5638805" y="2239298"/>
+            <a:ext cx="5486340" cy="3932872"/>
+          </a:xfrm>
+          <a:prstGeom prst="rect">
+            <a:avLst/>
+          </a:prstGeom>
+          <a:noFill/>
+        </p:spPr>
+        <p:txBody>
+          <a:bodyPr wrap="square" rtlCol="0">
+            <a:spAutoFit/>
+          </a:bodyPr>
+          <a:lstStyle/>
+          <a:p>
+            <a:pPr marL="457200" lvl="0" indent="-457200">
+              <a:lnSpc>
+                <a:spcPct val="90000"/>
+              </a:lnSpc>
+              <a:spcBef>
+                <a:spcPts val="1000"/>
+              </a:spcBef>
+              <a:buFont typeface="Arial" panose="020B0604020202020204" pitchFamily="34" charset="0"/>
+              <a:buChar char="•"/>
+            </a:pPr>
+            <a:r>
+              <a:rPr lang="en-US" sz="3300" dirty="0">
+                <a:solidFill>
+                  <a:prstClr val="black"/>
+                </a:solidFill>
+                <a:latin typeface="Roboto" panose="02000000000000000000" pitchFamily="2" charset="0"/>
+                <a:ea typeface="Roboto" panose="02000000000000000000" pitchFamily="2" charset="0"/>
+              </a:rPr>
+              <a:t>Interface </a:t>
+            </a:r>
+            <a:r>
+              <a:rPr lang="en-US" sz="3300" dirty="0" smtClean="0">
+                <a:solidFill>
+                  <a:prstClr val="black"/>
+                </a:solidFill>
+                <a:latin typeface="Roboto" panose="02000000000000000000" pitchFamily="2" charset="0"/>
+                <a:ea typeface="Roboto" panose="02000000000000000000" pitchFamily="2" charset="0"/>
+              </a:rPr>
+              <a:t>directly with </a:t>
+            </a:r>
+            <a:r>
+              <a:rPr lang="en-US" sz="3300" dirty="0">
+                <a:solidFill>
+                  <a:prstClr val="black"/>
+                </a:solidFill>
+                <a:latin typeface="Roboto" panose="02000000000000000000" pitchFamily="2" charset="0"/>
+                <a:ea typeface="Roboto" panose="02000000000000000000" pitchFamily="2" charset="0"/>
+              </a:rPr>
+              <a:t>car ECU </a:t>
+            </a:r>
+            <a:r>
+              <a:rPr lang="en-US" sz="3300" dirty="0" smtClean="0">
+                <a:solidFill>
+                  <a:prstClr val="black"/>
+                </a:solidFill>
+                <a:latin typeface="Roboto" panose="02000000000000000000" pitchFamily="2" charset="0"/>
+                <a:ea typeface="Roboto" panose="02000000000000000000" pitchFamily="2" charset="0"/>
+              </a:rPr>
+              <a:t>through </a:t>
+            </a:r>
+            <a:r>
+              <a:rPr lang="en-US" sz="3300" dirty="0">
+                <a:solidFill>
+                  <a:prstClr val="black"/>
+                </a:solidFill>
+                <a:latin typeface="Roboto" panose="02000000000000000000" pitchFamily="2" charset="0"/>
+                <a:ea typeface="Roboto" panose="02000000000000000000" pitchFamily="2" charset="0"/>
+              </a:rPr>
+              <a:t>OBD port</a:t>
+            </a:r>
+          </a:p>
+          <a:p>
+            <a:pPr marL="457200" lvl="0" indent="-457200">
+              <a:lnSpc>
+                <a:spcPct val="90000"/>
+              </a:lnSpc>
+              <a:spcBef>
+                <a:spcPts val="1000"/>
+              </a:spcBef>
+              <a:buFont typeface="Arial" panose="020B0604020202020204" pitchFamily="34" charset="0"/>
+              <a:buChar char="•"/>
+            </a:pPr>
+            <a:r>
+              <a:rPr lang="en-US" sz="3300" dirty="0" smtClean="0">
+                <a:solidFill>
+                  <a:prstClr val="black"/>
+                </a:solidFill>
+                <a:latin typeface="Roboto" panose="02000000000000000000" pitchFamily="2" charset="0"/>
+                <a:ea typeface="Roboto" panose="02000000000000000000" pitchFamily="2" charset="0"/>
+              </a:rPr>
+              <a:t>Broaden </a:t>
+            </a:r>
+            <a:r>
+              <a:rPr lang="en-US" sz="3300" dirty="0">
+                <a:solidFill>
+                  <a:prstClr val="black"/>
+                </a:solidFill>
+                <a:latin typeface="Roboto" panose="02000000000000000000" pitchFamily="2" charset="0"/>
+                <a:ea typeface="Roboto" panose="02000000000000000000" pitchFamily="2" charset="0"/>
+              </a:rPr>
+              <a:t>data spectrum</a:t>
+            </a:r>
+          </a:p>
+          <a:p>
+            <a:pPr marL="457200" lvl="0" indent="-457200">
+              <a:lnSpc>
+                <a:spcPct val="90000"/>
+              </a:lnSpc>
+              <a:spcBef>
+                <a:spcPts val="1000"/>
+              </a:spcBef>
+              <a:buFont typeface="Arial" panose="020B0604020202020204" pitchFamily="34" charset="0"/>
+              <a:buChar char="•"/>
+            </a:pPr>
+            <a:r>
+              <a:rPr lang="en-US" sz="3300" dirty="0" smtClean="0">
+                <a:solidFill>
+                  <a:prstClr val="black"/>
+                </a:solidFill>
+                <a:latin typeface="Roboto" panose="02000000000000000000" pitchFamily="2" charset="0"/>
+                <a:ea typeface="Roboto" panose="02000000000000000000" pitchFamily="2" charset="0"/>
+              </a:rPr>
+              <a:t>User customizable </a:t>
+            </a:r>
+            <a:r>
+              <a:rPr lang="en-US" sz="3300" dirty="0">
+                <a:solidFill>
+                  <a:prstClr val="black"/>
+                </a:solidFill>
+                <a:latin typeface="Roboto" panose="02000000000000000000" pitchFamily="2" charset="0"/>
+                <a:ea typeface="Roboto" panose="02000000000000000000" pitchFamily="2" charset="0"/>
+              </a:rPr>
+              <a:t>alerts </a:t>
+            </a:r>
+          </a:p>
+          <a:p>
+            <a:pPr marL="457200" lvl="0" indent="-457200">
+              <a:lnSpc>
+                <a:spcPct val="90000"/>
+              </a:lnSpc>
+              <a:spcBef>
+                <a:spcPts val="1000"/>
+              </a:spcBef>
+              <a:buFont typeface="Arial" panose="020B0604020202020204" pitchFamily="34" charset="0"/>
+              <a:buChar char="•"/>
+            </a:pPr>
+            <a:r>
+              <a:rPr lang="en-US" sz="3300" dirty="0">
+                <a:solidFill>
+                  <a:prstClr val="black"/>
+                </a:solidFill>
+                <a:latin typeface="Roboto" panose="02000000000000000000" pitchFamily="2" charset="0"/>
+                <a:ea typeface="Roboto" panose="02000000000000000000" pitchFamily="2" charset="0"/>
+              </a:rPr>
+              <a:t>Peer-to-peer </a:t>
+            </a:r>
+            <a:r>
+              <a:rPr lang="en-US" sz="3300" dirty="0" smtClean="0">
+                <a:solidFill>
+                  <a:prstClr val="black"/>
+                </a:solidFill>
+                <a:latin typeface="Roboto" panose="02000000000000000000" pitchFamily="2" charset="0"/>
+                <a:ea typeface="Roboto" panose="02000000000000000000" pitchFamily="2" charset="0"/>
+              </a:rPr>
+              <a:t>sharing</a:t>
+            </a:r>
+          </a:p>
+          <a:p>
+            <a:pPr marL="457200" lvl="0" indent="-457200">
+              <a:lnSpc>
+                <a:spcPct val="90000"/>
+              </a:lnSpc>
+              <a:spcBef>
+                <a:spcPts val="1000"/>
+              </a:spcBef>
+              <a:buFont typeface="Arial" panose="020B0604020202020204" pitchFamily="34" charset="0"/>
+              <a:buChar char="•"/>
+            </a:pPr>
+            <a:endParaRPr lang="en-US" sz="3300" dirty="0">
+              <a:solidFill>
+                <a:prstClr val="black"/>
+              </a:solidFill>
+              <a:latin typeface="Roboto" panose="02000000000000000000" pitchFamily="2" charset="0"/>
+              <a:ea typeface="Roboto" panose="02000000000000000000" pitchFamily="2" charset="0"/>
+            </a:endParaRPr>
+          </a:p>
+          <a:p>
+            <a:pPr marL="457200" lvl="0" indent="-457200">
+              <a:lnSpc>
+                <a:spcPct val="90000"/>
+              </a:lnSpc>
+              <a:spcBef>
+                <a:spcPts val="1000"/>
+              </a:spcBef>
+              <a:buFont typeface="Arial" panose="020B0604020202020204" pitchFamily="34" charset="0"/>
+              <a:buChar char="•"/>
+            </a:pPr>
+            <a:endParaRPr lang="en-US" sz="3300" dirty="0" smtClean="0">
+              <a:solidFill>
+                <a:prstClr val="black"/>
+              </a:solidFill>
+              <a:latin typeface="Roboto" panose="02000000000000000000" pitchFamily="2" charset="0"/>
+              <a:ea typeface="Roboto" panose="02000000000000000000" pitchFamily="2" charset="0"/>
+            </a:endParaRPr>
+          </a:p>
+        </p:txBody>
+      </p:sp>
+      <p:pic>
+        <p:nvPicPr>
+          <p:cNvPr id="5122" name="Picture 2" descr="Image result for delorean line image"/>
+          <p:cNvPicPr>
+            <a:picLocks noChangeAspect="1" noChangeArrowheads="1"/>
+          </p:cNvPicPr>
+          <p:nvPr/>
+        </p:nvPicPr>
+        <p:blipFill>
+          <a:blip r:embed="rId3">
+            <a:extLst>
+              <a:ext uri="{28A0092B-C50C-407E-A947-70E740481C1C}">
+                <a14:useLocalDpi xmlns:a14="http://schemas.microsoft.com/office/drawing/2010/main" val="0"/>
+              </a:ext>
+            </a:extLst>
+          </a:blip>
+          <a:srcRect/>
+          <a:stretch>
+            <a:fillRect/>
+          </a:stretch>
+        </p:blipFill>
+        <p:spPr bwMode="auto">
+          <a:xfrm>
+            <a:off x="-304730" y="1965976"/>
+            <a:ext cx="5852097" cy="3291804"/>
+          </a:xfrm>
+          <a:prstGeom prst="rect">
+            <a:avLst/>
+          </a:prstGeom>
+          <a:noFill/>
+          <a:extLst>
+            <a:ext uri="{909E8E84-426E-40DD-AFC4-6F175D3DCCD1}">
+              <a14:hiddenFill xmlns:a14="http://schemas.microsoft.com/office/drawing/2010/main">
+                <a:solidFill>
+                  <a:srgbClr val="FFFFFF"/>
+                </a:solidFill>
+              </a14:hiddenFill>
+            </a:ext>
+          </a:extLst>
+        </p:spPr>
+      </p:pic>
     </p:spTree>
     <p:extLst>
       <p:ext uri="{BB962C8B-B14F-4D97-AF65-F5344CB8AC3E}">
@@ -3806,4 +6539,265 @@
     </a:ext>
   </a:extLst>
 </a:theme>
+</file>
+
+<file path=ppt/theme/theme2.xml><?xml version="1.0" encoding="utf-8"?>
+<a:theme xmlns:a="http://schemas.openxmlformats.org/drawingml/2006/main" name="Office Theme">
+  <a:themeElements>
+    <a:clrScheme name="Office">
+      <a:dk1>
+        <a:sysClr val="windowText" lastClr="000000"/>
+      </a:dk1>
+      <a:lt1>
+        <a:sysClr val="window" lastClr="FFFFFF"/>
+      </a:lt1>
+      <a:dk2>
+        <a:srgbClr val="44546A"/>
+      </a:dk2>
+      <a:lt2>
+        <a:srgbClr val="E7E6E6"/>
+      </a:lt2>
+      <a:accent1>
+        <a:srgbClr val="5B9BD5"/>
+      </a:accent1>
+      <a:accent2>
+        <a:srgbClr val="ED7D31"/>
+      </a:accent2>
+      <a:accent3>
+        <a:srgbClr val="A5A5A5"/>
+      </a:accent3>
+      <a:accent4>
+        <a:srgbClr val="FFC000"/>
+      </a:accent4>
+      <a:accent5>
+        <a:srgbClr val="4472C4"/>
+      </a:accent5>
+      <a:accent6>
+        <a:srgbClr val="70AD47"/>
+      </a:accent6>
+      <a:hlink>
+        <a:srgbClr val="0563C1"/>
+      </a:hlink>
+      <a:folHlink>
+        <a:srgbClr val="954F72"/>
+      </a:folHlink>
+    </a:clrScheme>
+    <a:fontScheme name="Office">
+      <a:majorFont>
+        <a:latin typeface="Calibri Light" panose="020F0302020204030204"/>
+        <a:ea typeface=""/>
+        <a:cs typeface=""/>
+        <a:font script="Jpan" typeface="ＭＳ Ｐゴシック"/>
+        <a:font script="Hang" typeface="맑은 고딕"/>
+        <a:font script="Hans" typeface="宋体"/>
+        <a:font script="Hant" typeface="新細明體"/>
+        <a:font script="Arab" typeface="Times New Roman"/>
+        <a:font script="Hebr" typeface="Times New Roman"/>
+        <a:font script="Thai" typeface="Angsana New"/>
+        <a:font script="Ethi" typeface="Nyala"/>
+        <a:font script="Beng" typeface="Vrinda"/>
+        <a:font script="Gujr" typeface="Shruti"/>
+        <a:font script="Khmr" typeface="MoolBoran"/>
+        <a:font script="Knda" typeface="Tunga"/>
+        <a:font script="Guru" typeface="Raavi"/>
+        <a:font script="Cans" typeface="Euphemia"/>
+        <a:font script="Cher" typeface="Plantagenet Cherokee"/>
+        <a:font script="Yiii" typeface="Microsoft Yi Baiti"/>
+        <a:font script="Tibt" typeface="Microsoft Himalaya"/>
+        <a:font script="Thaa" typeface="MV Boli"/>
+        <a:font script="Deva" typeface="Mangal"/>
+        <a:font script="Telu" typeface="Gautami"/>
+        <a:font script="Taml" typeface="Latha"/>
+        <a:font script="Syrc" typeface="Estrangelo Edessa"/>
+        <a:font script="Orya" typeface="Kalinga"/>
+        <a:font script="Mlym" typeface="Kartika"/>
+        <a:font script="Laoo" typeface="DokChampa"/>
+        <a:font script="Sinh" typeface="Iskoola Pota"/>
+        <a:font script="Mong" typeface="Mongolian Baiti"/>
+        <a:font script="Viet" typeface="Times New Roman"/>
+        <a:font script="Uigh" typeface="Microsoft Uighur"/>
+        <a:font script="Geor" typeface="Sylfaen"/>
+      </a:majorFont>
+      <a:minorFont>
+        <a:latin typeface="Calibri" panose="020F0502020204030204"/>
+        <a:ea typeface=""/>
+        <a:cs typeface=""/>
+        <a:font script="Jpan" typeface="ＭＳ Ｐゴシック"/>
+        <a:font script="Hang" typeface="맑은 고딕"/>
+        <a:font script="Hans" typeface="宋体"/>
+        <a:font script="Hant" typeface="新細明體"/>
+        <a:font script="Arab" typeface="Arial"/>
+        <a:font script="Hebr" typeface="Arial"/>
+        <a:font script="Thai" typeface="Cordia New"/>
+        <a:font script="Ethi" typeface="Nyala"/>
+        <a:font script="Beng" typeface="Vrinda"/>
+        <a:font script="Gujr" typeface="Shruti"/>
+        <a:font script="Khmr" typeface="DaunPenh"/>
+        <a:font script="Knda" typeface="Tunga"/>
+        <a:font script="Guru" typeface="Raavi"/>
+        <a:font script="Cans" typeface="Euphemia"/>
+        <a:font script="Cher" typeface="Plantagenet Cherokee"/>
+        <a:font script="Yiii" typeface="Microsoft Yi Baiti"/>
+        <a:font script="Tibt" typeface="Microsoft Himalaya"/>
+        <a:font script="Thaa" typeface="MV Boli"/>
+        <a:font script="Deva" typeface="Mangal"/>
+        <a:font script="Telu" typeface="Gautami"/>
+        <a:font script="Taml" typeface="Latha"/>
+        <a:font script="Syrc" typeface="Estrangelo Edessa"/>
+        <a:font script="Orya" typeface="Kalinga"/>
+        <a:font script="Mlym" typeface="Kartika"/>
+        <a:font script="Laoo" typeface="DokChampa"/>
+        <a:font script="Sinh" typeface="Iskoola Pota"/>
+        <a:font script="Mong" typeface="Mongolian Baiti"/>
+        <a:font script="Viet" typeface="Arial"/>
+        <a:font script="Uigh" typeface="Microsoft Uighur"/>
+        <a:font script="Geor" typeface="Sylfaen"/>
+      </a:minorFont>
+    </a:fontScheme>
+    <a:fmtScheme name="Office">
+      <a:fillStyleLst>
+        <a:solidFill>
+          <a:schemeClr val="phClr"/>
+        </a:solidFill>
+        <a:gradFill rotWithShape="1">
+          <a:gsLst>
+            <a:gs pos="0">
+              <a:schemeClr val="phClr">
+                <a:lumMod val="110000"/>
+                <a:satMod val="105000"/>
+                <a:tint val="67000"/>
+              </a:schemeClr>
+            </a:gs>
+            <a:gs pos="50000">
+              <a:schemeClr val="phClr">
+                <a:lumMod val="105000"/>
+                <a:satMod val="103000"/>
+                <a:tint val="73000"/>
+              </a:schemeClr>
+            </a:gs>
+            <a:gs pos="100000">
+              <a:schemeClr val="phClr">
+                <a:lumMod val="105000"/>
+                <a:satMod val="109000"/>
+                <a:tint val="81000"/>
+              </a:schemeClr>
+            </a:gs>
+          </a:gsLst>
+          <a:lin ang="5400000" scaled="0"/>
+        </a:gradFill>
+        <a:gradFill rotWithShape="1">
+          <a:gsLst>
+            <a:gs pos="0">
+              <a:schemeClr val="phClr">
+                <a:satMod val="103000"/>
+                <a:lumMod val="102000"/>
+                <a:tint val="94000"/>
+              </a:schemeClr>
+            </a:gs>
+            <a:gs pos="50000">
+              <a:schemeClr val="phClr">
+                <a:satMod val="110000"/>
+                <a:lumMod val="100000"/>
+                <a:shade val="100000"/>
+              </a:schemeClr>
+            </a:gs>
+            <a:gs pos="100000">
+              <a:schemeClr val="phClr">
+                <a:lumMod val="99000"/>
+                <a:satMod val="120000"/>
+                <a:shade val="78000"/>
+              </a:schemeClr>
+            </a:gs>
+          </a:gsLst>
+          <a:lin ang="5400000" scaled="0"/>
+        </a:gradFill>
+      </a:fillStyleLst>
+      <a:lnStyleLst>
+        <a:ln w="6350" cap="flat" cmpd="sng" algn="ctr">
+          <a:solidFill>
+            <a:schemeClr val="phClr"/>
+          </a:solidFill>
+          <a:prstDash val="solid"/>
+          <a:miter lim="800000"/>
+        </a:ln>
+        <a:ln w="12700" cap="flat" cmpd="sng" algn="ctr">
+          <a:solidFill>
+            <a:schemeClr val="phClr"/>
+          </a:solidFill>
+          <a:prstDash val="solid"/>
+          <a:miter lim="800000"/>
+        </a:ln>
+        <a:ln w="19050" cap="flat" cmpd="sng" algn="ctr">
+          <a:solidFill>
+            <a:schemeClr val="phClr"/>
+          </a:solidFill>
+          <a:prstDash val="solid"/>
+          <a:miter lim="800000"/>
+        </a:ln>
+      </a:lnStyleLst>
+      <a:effectStyleLst>
+        <a:effectStyle>
+          <a:effectLst/>
+        </a:effectStyle>
+        <a:effectStyle>
+          <a:effectLst/>
+        </a:effectStyle>
+        <a:effectStyle>
+          <a:effectLst>
+            <a:outerShdw blurRad="57150" dist="19050" dir="5400000" algn="ctr" rotWithShape="0">
+              <a:srgbClr val="000000">
+                <a:alpha val="63000"/>
+              </a:srgbClr>
+            </a:outerShdw>
+          </a:effectLst>
+        </a:effectStyle>
+      </a:effectStyleLst>
+      <a:bgFillStyleLst>
+        <a:solidFill>
+          <a:schemeClr val="phClr"/>
+        </a:solidFill>
+        <a:solidFill>
+          <a:schemeClr val="phClr">
+            <a:tint val="95000"/>
+            <a:satMod val="170000"/>
+          </a:schemeClr>
+        </a:solidFill>
+        <a:gradFill rotWithShape="1">
+          <a:gsLst>
+            <a:gs pos="0">
+              <a:schemeClr val="phClr">
+                <a:tint val="93000"/>
+                <a:satMod val="150000"/>
+                <a:shade val="98000"/>
+                <a:lumMod val="102000"/>
+              </a:schemeClr>
+            </a:gs>
+            <a:gs pos="50000">
+              <a:schemeClr val="phClr">
+                <a:tint val="98000"/>
+                <a:satMod val="130000"/>
+                <a:shade val="90000"/>
+                <a:lumMod val="103000"/>
+              </a:schemeClr>
+            </a:gs>
+            <a:gs pos="100000">
+              <a:schemeClr val="phClr">
+                <a:shade val="63000"/>
+                <a:satMod val="120000"/>
+              </a:schemeClr>
+            </a:gs>
+          </a:gsLst>
+          <a:lin ang="5400000" scaled="0"/>
+        </a:gradFill>
+      </a:bgFillStyleLst>
+    </a:fmtScheme>
+  </a:themeElements>
+  <a:objectDefaults/>
+  <a:extraClrSchemeLst/>
+  <a:extLst>
+    <a:ext uri="{05A4C25C-085E-4340-85A3-A5531E510DB2}">
+      <thm15:themeFamily xmlns:thm15="http://schemas.microsoft.com/office/thememl/2012/main" name="Office Theme" id="{62F939B6-93AF-4DB8-9C6B-D6C7DFDC589F}" vid="{4A3C46E8-61CC-4603-A589-7422A47A8E4A}"/>
+    </a:ext>
+  </a:extLst>
+</a:theme>
 </file>
</xml_diff>